<commit_message>
clean up full screenings questions excel
</commit_message>
<xml_diff>
--- a/plots/prisma-result.pptx
+++ b/plots/prisma-result.pptx
@@ -104,6 +104,11 @@
       </a:defRPr>
     </a:lvl9pPr>
   </p:defaultTextStyle>
+  <p:extLst>
+    <p:ext uri="{EFAFB233-063F-42B5-8137-9DF3F51BA10A}">
+      <p15:sldGuideLst xmlns:p15="http://schemas.microsoft.com/office/powerpoint/2012/main"/>
+    </p:ext>
+  </p:extLst>
 </p:presentation>
 </file>
 
@@ -1093,7 +1098,7 @@
             <a:rPr lang="en-US" sz="1000" dirty="0">
               <a:latin typeface="Bodoni MT" panose="02070603080606020203" pitchFamily="18" charset="0"/>
             </a:rPr>
-            <a:t>1949 studies excluded</a:t>
+            <a:t>1954 studies excluded</a:t>
           </a:r>
         </a:p>
       </dgm:t>
@@ -1135,7 +1140,7 @@
             <a:rPr lang="en-US" sz="2000" b="1" dirty="0">
               <a:latin typeface="Bodoni MT" panose="02070603080606020203" pitchFamily="18" charset="0"/>
             </a:rPr>
-            <a:t>615</a:t>
+            <a:t>610</a:t>
           </a:r>
           <a:r>
             <a:rPr lang="en-US" sz="1000" dirty="0">
@@ -1191,7 +1196,7 @@
             <a:rPr lang="en-US" sz="1000" dirty="0">
               <a:latin typeface="Bodoni MT" panose="02070603080606020203" pitchFamily="18" charset="0"/>
             </a:rPr>
-            <a:t>161 studies excluded, thereof</a:t>
+            <a:t>160 studies excluded, thereof</a:t>
           </a:r>
         </a:p>
       </dgm:t>
@@ -1233,7 +1238,7 @@
             <a:rPr lang="en-US" sz="1000" dirty="0">
               <a:latin typeface="Bodoni MT" panose="02070603080606020203" pitchFamily="18" charset="0"/>
             </a:rPr>
-            <a:t>80  With no concrete medical supervised ML use case</a:t>
+            <a:t>87  With no concrete medical supervised ML use case</a:t>
           </a:r>
         </a:p>
       </dgm:t>
@@ -1275,7 +1280,7 @@
             <a:rPr lang="en-US" sz="1000" dirty="0">
               <a:latin typeface="Bodoni MT" panose="02070603080606020203" pitchFamily="18" charset="0"/>
             </a:rPr>
-            <a:t>66  No XAI method provided</a:t>
+            <a:t>64  No XAI method provided</a:t>
           </a:r>
         </a:p>
       </dgm:t>
@@ -1317,7 +1322,7 @@
             <a:rPr lang="en-US" sz="1000" dirty="0">
               <a:latin typeface="Bodoni MT" panose="02070603080606020203" pitchFamily="18" charset="0"/>
             </a:rPr>
-            <a:t>15  No tabular or image data as input</a:t>
+            <a:t>13  No tabular or image data as input</a:t>
           </a:r>
         </a:p>
       </dgm:t>
@@ -1359,14 +1364,11 @@
             <a:rPr lang="en-US" sz="2000" b="1" dirty="0">
               <a:latin typeface="Bodoni MT" panose="02070603080606020203" pitchFamily="18" charset="0"/>
             </a:rPr>
-            <a:t>454</a:t>
+            <a:t>450</a:t>
           </a:r>
-          <a:r>
-            <a:rPr lang="en-US" sz="1000" dirty="0">
-              <a:latin typeface="Bodoni MT" panose="02070603080606020203" pitchFamily="18" charset="0"/>
-            </a:rPr>
-            <a:t> </a:t>
-          </a:r>
+          <a:endParaRPr lang="en-US" sz="1000" dirty="0">
+            <a:latin typeface="Bodoni MT" panose="02070603080606020203" pitchFamily="18" charset="0"/>
+          </a:endParaRPr>
         </a:p>
         <a:p>
           <a:r>
@@ -1401,6 +1403,47 @@
           <a:endParaRPr lang="en-US">
             <a:latin typeface="Bodoni MT" panose="02070603080606020203" pitchFamily="18" charset="0"/>
           </a:endParaRPr>
+        </a:p>
+      </dgm:t>
+    </dgm:pt>
+    <dgm:pt modelId="{9D043616-DD0F-448A-B93B-D161BA961365}">
+      <dgm:prSet custT="1"/>
+      <dgm:spPr/>
+      <dgm:t>
+        <a:bodyPr/>
+        <a:lstStyle/>
+        <a:p>
+          <a:pPr>
+            <a:buNone/>
+          </a:pPr>
+          <a:r>
+            <a:rPr lang="en-US" sz="1000" dirty="0">
+              <a:latin typeface="Bodoni MT" panose="02070603080606020203" pitchFamily="18" charset="0"/>
+            </a:rPr>
+            <a:t>(Multiple reasons possible)</a:t>
+          </a:r>
+        </a:p>
+      </dgm:t>
+    </dgm:pt>
+    <dgm:pt modelId="{B06A7E26-5736-418B-9820-F6D115585981}" type="parTrans" cxnId="{9DA39400-5950-4655-B3D0-4BBE32DC8B49}">
+      <dgm:prSet/>
+      <dgm:spPr/>
+      <dgm:t>
+        <a:bodyPr/>
+        <a:lstStyle/>
+        <a:p>
+          <a:endParaRPr lang="en-US"/>
+        </a:p>
+      </dgm:t>
+    </dgm:pt>
+    <dgm:pt modelId="{70BB015B-509E-4A8B-8950-EE45A273F593}" type="sibTrans" cxnId="{9DA39400-5950-4655-B3D0-4BBE32DC8B49}">
+      <dgm:prSet/>
+      <dgm:spPr/>
+      <dgm:t>
+        <a:bodyPr/>
+        <a:lstStyle/>
+        <a:p>
+          <a:endParaRPr lang="en-US"/>
         </a:p>
       </dgm:t>
     </dgm:pt>
@@ -1527,6 +1570,7 @@
     </dgm:pt>
   </dgm:ptLst>
   <dgm:cxnLst>
+    <dgm:cxn modelId="{9DA39400-5950-4655-B3D0-4BBE32DC8B49}" srcId="{451F3664-1887-4073-8260-9FC7F369F14A}" destId="{9D043616-DD0F-448A-B93B-D161BA961365}" srcOrd="1" destOrd="0" parTransId="{B06A7E26-5736-418B-9820-F6D115585981}" sibTransId="{70BB015B-509E-4A8B-8950-EE45A273F593}"/>
     <dgm:cxn modelId="{4BDB2A11-FB71-40D2-881F-B0DF4E98DA28}" type="presOf" srcId="{5E813B8B-CA9F-4A4A-A827-6EF1EC5201C8}" destId="{D3EB5422-A1F1-4291-BEC8-0547614BDD92}" srcOrd="0" destOrd="0" presId="urn:microsoft.com/office/officeart/2005/8/layout/StepDownProcess"/>
     <dgm:cxn modelId="{ECFE1F21-13F5-49B7-9FAB-9BC7C83F8E0B}" type="presOf" srcId="{BA0E5C66-AD95-4EC1-BB57-CA5D431D8EAA}" destId="{7CCEF52E-E578-4FDA-97A0-463CA04D1058}" srcOrd="0" destOrd="0" presId="urn:microsoft.com/office/officeart/2005/8/layout/StepDownProcess"/>
     <dgm:cxn modelId="{4329AB21-D5CE-442A-9C6A-0A6D85A9563E}" type="presOf" srcId="{4415FC87-F301-4E23-B07B-6D9238A4755B}" destId="{488A750B-8CAC-4B0D-B3DD-DE623A4E466A}" srcOrd="0" destOrd="0" presId="urn:microsoft.com/office/officeart/2005/8/layout/StepDownProcess"/>
@@ -1542,6 +1586,7 @@
     <dgm:cxn modelId="{DB147290-445E-42BB-A81C-9A37299F5B47}" srcId="{81415F0E-C1C2-4430-B6A7-F2FFAC97A734}" destId="{358238D7-E74F-4423-A94B-B71561329738}" srcOrd="0" destOrd="0" parTransId="{6A0EAA4A-52A0-44FB-9546-84CD2E880CDF}" sibTransId="{86B24066-FA7B-44F6-9E1C-A634C0C9EF7C}"/>
     <dgm:cxn modelId="{0FC51995-F374-488B-AB98-15D06F1A2F06}" srcId="{BA0E5C66-AD95-4EC1-BB57-CA5D431D8EAA}" destId="{6ADB44EB-3DF3-4A15-A9B3-70A75CB14CB8}" srcOrd="1" destOrd="0" parTransId="{D2D74A81-C10B-4D41-9CE7-6189E4758018}" sibTransId="{2A35F0A1-5BA0-4D26-8F0C-17FE9D2DBE82}"/>
     <dgm:cxn modelId="{D92BCB98-4B37-435D-939F-7C0269349C19}" type="presOf" srcId="{F07690B9-CE80-4DE9-9DE7-0F534D374BCF}" destId="{7CCEF52E-E578-4FDA-97A0-463CA04D1058}" srcOrd="0" destOrd="3" presId="urn:microsoft.com/office/officeart/2005/8/layout/StepDownProcess"/>
+    <dgm:cxn modelId="{506767A8-6B32-47DC-8D4F-6F8E372D1813}" type="presOf" srcId="{9D043616-DD0F-448A-B93B-D161BA961365}" destId="{7CCEF52E-E578-4FDA-97A0-463CA04D1058}" srcOrd="0" destOrd="4" presId="urn:microsoft.com/office/officeart/2005/8/layout/StepDownProcess"/>
     <dgm:cxn modelId="{D57D1AB7-E435-4951-8BD5-C61C60B9C81C}" srcId="{358238D7-E74F-4423-A94B-B71561329738}" destId="{E77E0608-80C9-4293-8CD2-6B04DE83409C}" srcOrd="0" destOrd="0" parTransId="{CB692754-ED6C-41A1-8625-ECA7B0CDB238}" sibTransId="{2162E976-B723-4CE0-A88A-EB2FBD3DB60E}"/>
     <dgm:cxn modelId="{6DEE07D7-629B-44E6-A853-E6B13AAF81E7}" srcId="{451F3664-1887-4073-8260-9FC7F369F14A}" destId="{BA0E5C66-AD95-4EC1-BB57-CA5D431D8EAA}" srcOrd="0" destOrd="0" parTransId="{B92605C3-A23A-4F34-85AC-7BF68405C28E}" sibTransId="{15BAEAF5-FD6B-4205-808F-F6655484FC4A}"/>
     <dgm:cxn modelId="{AA9C34D9-1331-4278-BCAE-4D5C00AFF55D}" type="presOf" srcId="{451F3664-1887-4073-8260-9FC7F369F14A}" destId="{1B6B7786-2D11-4F92-8BF2-5C0FB4A772F1}" srcOrd="0" destOrd="0" presId="urn:microsoft.com/office/officeart/2005/8/layout/StepDownProcess"/>
@@ -2025,7 +2070,7 @@
             <a:rPr lang="en-US" sz="1000" kern="1200" dirty="0">
               <a:latin typeface="Bodoni MT" panose="02070603080606020203" pitchFamily="18" charset="0"/>
             </a:rPr>
-            <a:t>1949 studies excluded</a:t>
+            <a:t>1954 studies excluded</a:t>
           </a:r>
         </a:p>
       </dsp:txBody>
@@ -2162,7 +2207,7 @@
             <a:rPr lang="en-US" sz="2000" b="1" kern="1200" dirty="0">
               <a:latin typeface="Bodoni MT" panose="02070603080606020203" pitchFamily="18" charset="0"/>
             </a:rPr>
-            <a:t>615</a:t>
+            <a:t>610</a:t>
           </a:r>
           <a:r>
             <a:rPr lang="en-US" sz="1000" kern="1200" dirty="0">
@@ -2250,7 +2295,7 @@
             <a:rPr lang="en-US" sz="1000" kern="1200" dirty="0">
               <a:latin typeface="Bodoni MT" panose="02070603080606020203" pitchFamily="18" charset="0"/>
             </a:rPr>
-            <a:t>161 studies excluded, thereof</a:t>
+            <a:t>160 studies excluded, thereof</a:t>
           </a:r>
         </a:p>
         <a:p>
@@ -2270,7 +2315,7 @@
             <a:rPr lang="en-US" sz="1000" kern="1200" dirty="0">
               <a:latin typeface="Bodoni MT" panose="02070603080606020203" pitchFamily="18" charset="0"/>
             </a:rPr>
-            <a:t>80  With no concrete medical supervised ML use case</a:t>
+            <a:t>87  With no concrete medical supervised ML use case</a:t>
           </a:r>
         </a:p>
         <a:p>
@@ -2290,7 +2335,7 @@
             <a:rPr lang="en-US" sz="1000" kern="1200" dirty="0">
               <a:latin typeface="Bodoni MT" panose="02070603080606020203" pitchFamily="18" charset="0"/>
             </a:rPr>
-            <a:t>66  No XAI method provided</a:t>
+            <a:t>64  No XAI method provided</a:t>
           </a:r>
         </a:p>
         <a:p>
@@ -2310,7 +2355,27 @@
             <a:rPr lang="en-US" sz="1000" kern="1200" dirty="0">
               <a:latin typeface="Bodoni MT" panose="02070603080606020203" pitchFamily="18" charset="0"/>
             </a:rPr>
-            <a:t>15  No tabular or image data as input</a:t>
+            <a:t>13  No tabular or image data as input</a:t>
+          </a:r>
+        </a:p>
+        <a:p>
+          <a:pPr marL="57150" lvl="1" indent="-57150" algn="l" defTabSz="444500">
+            <a:lnSpc>
+              <a:spcPct val="90000"/>
+            </a:lnSpc>
+            <a:spcBef>
+              <a:spcPct val="0"/>
+            </a:spcBef>
+            <a:spcAft>
+              <a:spcPct val="15000"/>
+            </a:spcAft>
+            <a:buNone/>
+          </a:pPr>
+          <a:r>
+            <a:rPr lang="en-US" sz="1000" kern="1200" dirty="0">
+              <a:latin typeface="Bodoni MT" panose="02070603080606020203" pitchFamily="18" charset="0"/>
+            </a:rPr>
+            <a:t>(Multiple reasons possible)</a:t>
           </a:r>
         </a:p>
       </dsp:txBody>
@@ -2393,14 +2458,11 @@
             <a:rPr lang="en-US" sz="2000" b="1" kern="1200" dirty="0">
               <a:latin typeface="Bodoni MT" panose="02070603080606020203" pitchFamily="18" charset="0"/>
             </a:rPr>
-            <a:t>454</a:t>
+            <a:t>450</a:t>
           </a:r>
-          <a:r>
-            <a:rPr lang="en-US" sz="1000" kern="1200" dirty="0">
-              <a:latin typeface="Bodoni MT" panose="02070603080606020203" pitchFamily="18" charset="0"/>
-            </a:rPr>
-            <a:t> </a:t>
-          </a:r>
+          <a:endParaRPr lang="en-US" sz="1000" kern="1200" dirty="0">
+            <a:latin typeface="Bodoni MT" panose="02070603080606020203" pitchFamily="18" charset="0"/>
+          </a:endParaRPr>
         </a:p>
         <a:p>
           <a:pPr marL="0" lvl="0" indent="0" algn="ctr" defTabSz="889000">
@@ -3933,7 +3995,7 @@
           <a:p>
             <a:fld id="{4105D68D-A848-48D9-AC97-91B30B8D5097}" type="datetimeFigureOut">
               <a:rPr lang="en-US" smtClean="0"/>
-              <a:t>6/9/2022</a:t>
+              <a:t>6/14/2022</a:t>
             </a:fld>
             <a:endParaRPr lang="en-US"/>
           </a:p>
@@ -4133,7 +4195,7 @@
           <a:p>
             <a:fld id="{4105D68D-A848-48D9-AC97-91B30B8D5097}" type="datetimeFigureOut">
               <a:rPr lang="en-US" smtClean="0"/>
-              <a:t>6/9/2022</a:t>
+              <a:t>6/14/2022</a:t>
             </a:fld>
             <a:endParaRPr lang="en-US"/>
           </a:p>
@@ -4343,7 +4405,7 @@
           <a:p>
             <a:fld id="{4105D68D-A848-48D9-AC97-91B30B8D5097}" type="datetimeFigureOut">
               <a:rPr lang="en-US" smtClean="0"/>
-              <a:t>6/9/2022</a:t>
+              <a:t>6/14/2022</a:t>
             </a:fld>
             <a:endParaRPr lang="en-US"/>
           </a:p>
@@ -4543,7 +4605,7 @@
           <a:p>
             <a:fld id="{4105D68D-A848-48D9-AC97-91B30B8D5097}" type="datetimeFigureOut">
               <a:rPr lang="en-US" smtClean="0"/>
-              <a:t>6/9/2022</a:t>
+              <a:t>6/14/2022</a:t>
             </a:fld>
             <a:endParaRPr lang="en-US"/>
           </a:p>
@@ -4819,7 +4881,7 @@
           <a:p>
             <a:fld id="{4105D68D-A848-48D9-AC97-91B30B8D5097}" type="datetimeFigureOut">
               <a:rPr lang="en-US" smtClean="0"/>
-              <a:t>6/9/2022</a:t>
+              <a:t>6/14/2022</a:t>
             </a:fld>
             <a:endParaRPr lang="en-US"/>
           </a:p>
@@ -5087,7 +5149,7 @@
           <a:p>
             <a:fld id="{4105D68D-A848-48D9-AC97-91B30B8D5097}" type="datetimeFigureOut">
               <a:rPr lang="en-US" smtClean="0"/>
-              <a:t>6/9/2022</a:t>
+              <a:t>6/14/2022</a:t>
             </a:fld>
             <a:endParaRPr lang="en-US"/>
           </a:p>
@@ -5502,7 +5564,7 @@
           <a:p>
             <a:fld id="{4105D68D-A848-48D9-AC97-91B30B8D5097}" type="datetimeFigureOut">
               <a:rPr lang="en-US" smtClean="0"/>
-              <a:t>6/9/2022</a:t>
+              <a:t>6/14/2022</a:t>
             </a:fld>
             <a:endParaRPr lang="en-US"/>
           </a:p>
@@ -5644,7 +5706,7 @@
           <a:p>
             <a:fld id="{4105D68D-A848-48D9-AC97-91B30B8D5097}" type="datetimeFigureOut">
               <a:rPr lang="en-US" smtClean="0"/>
-              <a:t>6/9/2022</a:t>
+              <a:t>6/14/2022</a:t>
             </a:fld>
             <a:endParaRPr lang="en-US"/>
           </a:p>
@@ -5757,7 +5819,7 @@
           <a:p>
             <a:fld id="{4105D68D-A848-48D9-AC97-91B30B8D5097}" type="datetimeFigureOut">
               <a:rPr lang="en-US" smtClean="0"/>
-              <a:t>6/9/2022</a:t>
+              <a:t>6/14/2022</a:t>
             </a:fld>
             <a:endParaRPr lang="en-US"/>
           </a:p>
@@ -6070,7 +6132,7 @@
           <a:p>
             <a:fld id="{4105D68D-A848-48D9-AC97-91B30B8D5097}" type="datetimeFigureOut">
               <a:rPr lang="en-US" smtClean="0"/>
-              <a:t>6/9/2022</a:t>
+              <a:t>6/14/2022</a:t>
             </a:fld>
             <a:endParaRPr lang="en-US"/>
           </a:p>
@@ -6359,7 +6421,7 @@
           <a:p>
             <a:fld id="{4105D68D-A848-48D9-AC97-91B30B8D5097}" type="datetimeFigureOut">
               <a:rPr lang="en-US" smtClean="0"/>
-              <a:t>6/9/2022</a:t>
+              <a:t>6/14/2022</a:t>
             </a:fld>
             <a:endParaRPr lang="en-US"/>
           </a:p>
@@ -6602,7 +6664,7 @@
           <a:p>
             <a:fld id="{4105D68D-A848-48D9-AC97-91B30B8D5097}" type="datetimeFigureOut">
               <a:rPr lang="en-US" smtClean="0"/>
-              <a:t>6/9/2022</a:t>
+              <a:t>6/14/2022</a:t>
             </a:fld>
             <a:endParaRPr lang="en-US"/>
           </a:p>
@@ -7032,7 +7094,7 @@
           <p:nvPr>
             <p:extLst>
               <p:ext uri="{D42A27DB-BD31-4B8C-83A1-F6EECF244321}">
-                <p14:modId xmlns:p14="http://schemas.microsoft.com/office/powerpoint/2010/main" val="4263154014"/>
+                <p14:modId xmlns:p14="http://schemas.microsoft.com/office/powerpoint/2010/main" val="2778994355"/>
               </p:ext>
             </p:extLst>
           </p:nvPr>

</xml_diff>

<commit_message>
Major revision changes Part 1
</commit_message>
<xml_diff>
--- a/plots/prisma-result.pptx
+++ b/plots/prisma-result.pptx
@@ -923,7 +923,7 @@
 <dgm:dataModel xmlns:dgm="http://schemas.openxmlformats.org/drawingml/2006/diagram" xmlns:a="http://schemas.openxmlformats.org/drawingml/2006/main">
   <dgm:ptLst>
     <dgm:pt modelId="{81415F0E-C1C2-4430-B6A7-F2FFAC97A734}" type="doc">
-      <dgm:prSet loTypeId="urn:microsoft.com/office/officeart/2005/8/layout/chevron1" loCatId="process" qsTypeId="urn:microsoft.com/office/officeart/2005/8/quickstyle/simple1" qsCatId="simple" csTypeId="urn:microsoft.com/office/officeart/2005/8/colors/accent0_1" csCatId="mainScheme" phldr="1"/>
+      <dgm:prSet loTypeId="urn:microsoft.com/office/officeart/2005/8/layout/process2" loCatId="process" qsTypeId="urn:microsoft.com/office/officeart/2005/8/quickstyle/simple1" qsCatId="simple" csTypeId="urn:microsoft.com/office/officeart/2005/8/colors/accent0_1" csCatId="mainScheme" phldr="1"/>
       <dgm:spPr/>
       <dgm:t>
         <a:bodyPr/>
@@ -935,27 +935,25 @@
     </dgm:pt>
     <dgm:pt modelId="{358238D7-E74F-4423-A94B-B71561329738}">
       <dgm:prSet phldrT="[Text]" custT="1"/>
-      <dgm:spPr/>
+      <dgm:spPr>
+        <a:solidFill>
+          <a:srgbClr val="CCC6E2"/>
+        </a:solidFill>
+      </dgm:spPr>
       <dgm:t>
         <a:bodyPr anchor="ctr"/>
         <a:lstStyle/>
         <a:p>
           <a:pPr>
             <a:lnSpc>
-              <a:spcPct val="100000"/>
+              <a:spcPct val="90000"/>
             </a:lnSpc>
           </a:pPr>
           <a:r>
-            <a:rPr lang="en-US" sz="1500" b="1" dirty="0">
+            <a:rPr lang="en-US" sz="1400" b="0" dirty="0">
               <a:latin typeface="Bodoni MT" panose="02070603080606020203" pitchFamily="18" charset="0"/>
             </a:rPr>
-            <a:t>2568</a:t>
-          </a:r>
-          <a:r>
-            <a:rPr lang="en-US" sz="1000" dirty="0">
-              <a:latin typeface="Bodoni MT" panose="02070603080606020203" pitchFamily="18" charset="0"/>
-            </a:rPr>
-            <a:t> </a:t>
+            <a:t>Records identified from Databases </a:t>
           </a:r>
         </a:p>
         <a:p>
@@ -965,10 +963,10 @@
             </a:lnSpc>
           </a:pPr>
           <a:r>
-            <a:rPr lang="en-US" sz="1000" dirty="0">
+            <a:rPr lang="en-US" sz="1400" b="0" dirty="0">
               <a:latin typeface="Bodoni MT" panose="02070603080606020203" pitchFamily="18" charset="0"/>
             </a:rPr>
-            <a:t>references imported</a:t>
+            <a:t>(n = 2568)</a:t>
           </a:r>
         </a:p>
       </dgm:t>
@@ -980,68 +978,21 @@
         <a:bodyPr/>
         <a:lstStyle/>
         <a:p>
-          <a:endParaRPr lang="en-US" sz="1000">
+          <a:endParaRPr lang="en-US" sz="1400" b="0">
             <a:latin typeface="Bodoni MT" panose="02070603080606020203" pitchFamily="18" charset="0"/>
           </a:endParaRPr>
         </a:p>
       </dgm:t>
     </dgm:pt>
     <dgm:pt modelId="{86B24066-FA7B-44F6-9E1C-A634C0C9EF7C}" type="sibTrans" cxnId="{DB147290-445E-42BB-A81C-9A37299F5B47}">
-      <dgm:prSet/>
+      <dgm:prSet custT="1"/>
       <dgm:spPr/>
       <dgm:t>
         <a:bodyPr/>
         <a:lstStyle/>
         <a:p>
-          <a:endParaRPr lang="en-US" sz="1000">
-            <a:latin typeface="Bodoni MT" panose="02070603080606020203" pitchFamily="18" charset="0"/>
-          </a:endParaRPr>
-        </a:p>
-      </dgm:t>
-    </dgm:pt>
-    <dgm:pt modelId="{E77E0608-80C9-4293-8CD2-6B04DE83409C}">
-      <dgm:prSet phldrT="[Text]" custT="1"/>
-      <dgm:spPr/>
-      <dgm:t>
-        <a:bodyPr/>
-        <a:lstStyle/>
-        <a:p>
-          <a:r>
-            <a:rPr lang="en-US" sz="1000" b="1" dirty="0">
-              <a:latin typeface="Bodoni MT" panose="02070603080606020203" pitchFamily="18" charset="0"/>
-            </a:rPr>
-            <a:t>4</a:t>
-          </a:r>
-          <a:r>
-            <a:rPr lang="en-US" sz="1000" dirty="0">
-              <a:latin typeface="Bodoni MT" panose="02070603080606020203" pitchFamily="18" charset="0"/>
-            </a:rPr>
-            <a:t> duplicates removed</a:t>
-          </a:r>
-        </a:p>
-      </dgm:t>
-    </dgm:pt>
-    <dgm:pt modelId="{CB692754-ED6C-41A1-8625-ECA7B0CDB238}" type="parTrans" cxnId="{D57D1AB7-E435-4951-8BD5-C61C60B9C81C}">
-      <dgm:prSet/>
-      <dgm:spPr/>
-      <dgm:t>
-        <a:bodyPr/>
-        <a:lstStyle/>
-        <a:p>
-          <a:endParaRPr lang="en-US" sz="1000">
-            <a:latin typeface="Bodoni MT" panose="02070603080606020203" pitchFamily="18" charset="0"/>
-          </a:endParaRPr>
-        </a:p>
-      </dgm:t>
-    </dgm:pt>
-    <dgm:pt modelId="{2162E976-B723-4CE0-A88A-EB2FBD3DB60E}" type="sibTrans" cxnId="{D57D1AB7-E435-4951-8BD5-C61C60B9C81C}">
-      <dgm:prSet/>
-      <dgm:spPr/>
-      <dgm:t>
-        <a:bodyPr/>
-        <a:lstStyle/>
-        <a:p>
-          <a:endParaRPr lang="en-US" sz="1000">
+          <a:pPr rtl="0"/>
+          <a:endParaRPr lang="en-US" sz="1400" b="0">
             <a:latin typeface="Bodoni MT" panose="02070603080606020203" pitchFamily="18" charset="0"/>
           </a:endParaRPr>
         </a:p>
@@ -1049,30 +1000,86 @@
     </dgm:pt>
     <dgm:pt modelId="{5E813B8B-CA9F-4A4A-A827-6EF1EC5201C8}">
       <dgm:prSet phldrT="[Text]" custT="1"/>
-      <dgm:spPr/>
+      <dgm:spPr>
+        <a:solidFill>
+          <a:srgbClr val="CCC6E2"/>
+        </a:solidFill>
+        <a:ln w="12700" cap="flat" cmpd="sng" algn="ctr">
+          <a:solidFill>
+            <a:prstClr val="black">
+              <a:shade val="80000"/>
+              <a:hueOff val="0"/>
+              <a:satOff val="0"/>
+              <a:lumOff val="0"/>
+              <a:alphaOff val="0"/>
+            </a:prstClr>
+          </a:solidFill>
+          <a:prstDash val="solid"/>
+          <a:miter lim="800000"/>
+        </a:ln>
+        <a:effectLst/>
+      </dgm:spPr>
       <dgm:t>
-        <a:bodyPr/>
+        <a:bodyPr spcFirstLastPara="0" vert="horz" wrap="square" lIns="38100" tIns="38100" rIns="38100" bIns="38100" numCol="1" spcCol="1270" anchor="ctr" anchorCtr="0"/>
         <a:lstStyle/>
         <a:p>
+          <a:pPr marL="0" lvl="0" algn="ctr" defTabSz="444500">
+            <a:lnSpc>
+              <a:spcPct val="90000"/>
+            </a:lnSpc>
+            <a:spcBef>
+              <a:spcPct val="0"/>
+            </a:spcBef>
+            <a:spcAft>
+              <a:spcPct val="35000"/>
+            </a:spcAft>
+            <a:buNone/>
+          </a:pPr>
           <a:r>
-            <a:rPr lang="en-US" sz="1500" b="1" dirty="0">
+            <a:rPr lang="en-US" sz="1400" b="0" kern="1200" dirty="0">
+              <a:solidFill>
+                <a:prstClr val="black">
+                  <a:hueOff val="0"/>
+                  <a:satOff val="0"/>
+                  <a:lumOff val="0"/>
+                  <a:alphaOff val="0"/>
+                </a:prstClr>
+              </a:solidFill>
               <a:latin typeface="Bodoni MT" panose="02070603080606020203" pitchFamily="18" charset="0"/>
+              <a:ea typeface="+mn-ea"/>
+              <a:cs typeface="+mn-cs"/>
             </a:rPr>
-            <a:t>2564</a:t>
-          </a:r>
-          <a:r>
-            <a:rPr lang="en-US" sz="1000" dirty="0">
-              <a:latin typeface="Bodoni MT" panose="02070603080606020203" pitchFamily="18" charset="0"/>
-            </a:rPr>
-            <a:t> </a:t>
+            <a:t>Record screened </a:t>
           </a:r>
         </a:p>
         <a:p>
+          <a:pPr marL="0" lvl="0" algn="ctr" defTabSz="444500">
+            <a:lnSpc>
+              <a:spcPct val="90000"/>
+            </a:lnSpc>
+            <a:spcBef>
+              <a:spcPct val="0"/>
+            </a:spcBef>
+            <a:spcAft>
+              <a:spcPct val="35000"/>
+            </a:spcAft>
+            <a:buNone/>
+          </a:pPr>
           <a:r>
-            <a:rPr lang="en-US" sz="1000" dirty="0">
+            <a:rPr lang="en-US" sz="1400" b="0" kern="1200" dirty="0">
+              <a:solidFill>
+                <a:prstClr val="black">
+                  <a:hueOff val="0"/>
+                  <a:satOff val="0"/>
+                  <a:lumOff val="0"/>
+                  <a:alphaOff val="0"/>
+                </a:prstClr>
+              </a:solidFill>
               <a:latin typeface="Bodoni MT" panose="02070603080606020203" pitchFamily="18" charset="0"/>
+              <a:ea typeface="+mn-ea"/>
+              <a:cs typeface="+mn-cs"/>
             </a:rPr>
-            <a:t>studies screened against title and abstract</a:t>
+            <a:t>(n=2564 )</a:t>
           </a:r>
         </a:p>
       </dgm:t>
@@ -1084,68 +1091,21 @@
         <a:bodyPr/>
         <a:lstStyle/>
         <a:p>
-          <a:endParaRPr lang="en-US" sz="1000">
+          <a:endParaRPr lang="en-US" sz="1400" b="0">
             <a:latin typeface="Bodoni MT" panose="02070603080606020203" pitchFamily="18" charset="0"/>
           </a:endParaRPr>
         </a:p>
       </dgm:t>
     </dgm:pt>
     <dgm:pt modelId="{39F5DBEC-F85A-4BE9-B98B-3C9A98243099}" type="sibTrans" cxnId="{5BCA4328-2E72-4572-8A65-1B09192BB03C}">
-      <dgm:prSet/>
+      <dgm:prSet custT="1"/>
       <dgm:spPr/>
       <dgm:t>
         <a:bodyPr/>
         <a:lstStyle/>
         <a:p>
-          <a:endParaRPr lang="en-US" sz="1000">
-            <a:latin typeface="Bodoni MT" panose="02070603080606020203" pitchFamily="18" charset="0"/>
-          </a:endParaRPr>
-        </a:p>
-      </dgm:t>
-    </dgm:pt>
-    <dgm:pt modelId="{8D0365F7-453A-4002-9948-18E5EB6DC029}">
-      <dgm:prSet phldrT="[Text]" custT="1"/>
-      <dgm:spPr/>
-      <dgm:t>
-        <a:bodyPr/>
-        <a:lstStyle/>
-        <a:p>
-          <a:r>
-            <a:rPr lang="en-US" sz="1000" b="1" dirty="0">
-              <a:latin typeface="Bodoni MT" panose="02070603080606020203" pitchFamily="18" charset="0"/>
-            </a:rPr>
-            <a:t>1954</a:t>
-          </a:r>
-          <a:r>
-            <a:rPr lang="en-US" sz="1000" dirty="0">
-              <a:latin typeface="Bodoni MT" panose="02070603080606020203" pitchFamily="18" charset="0"/>
-            </a:rPr>
-            <a:t> studies excluded</a:t>
-          </a:r>
-        </a:p>
-      </dgm:t>
-    </dgm:pt>
-    <dgm:pt modelId="{07BFB033-D595-4D91-885A-773D6F2CD47B}" type="parTrans" cxnId="{5A336B28-242C-480D-9A9E-29E0F72E7728}">
-      <dgm:prSet/>
-      <dgm:spPr/>
-      <dgm:t>
-        <a:bodyPr/>
-        <a:lstStyle/>
-        <a:p>
-          <a:endParaRPr lang="en-US" sz="1000">
-            <a:latin typeface="Bodoni MT" panose="02070603080606020203" pitchFamily="18" charset="0"/>
-          </a:endParaRPr>
-        </a:p>
-      </dgm:t>
-    </dgm:pt>
-    <dgm:pt modelId="{896D9EBE-8E33-4CD7-BD2C-10BC27DAF13E}" type="sibTrans" cxnId="{5A336B28-242C-480D-9A9E-29E0F72E7728}">
-      <dgm:prSet/>
-      <dgm:spPr/>
-      <dgm:t>
-        <a:bodyPr/>
-        <a:lstStyle/>
-        <a:p>
-          <a:endParaRPr lang="en-US" sz="1000">
+          <a:pPr rtl="0"/>
+          <a:endParaRPr lang="en-US" sz="1400" b="0">
             <a:latin typeface="Bodoni MT" panose="02070603080606020203" pitchFamily="18" charset="0"/>
           </a:endParaRPr>
         </a:p>
@@ -1153,30 +1113,64 @@
     </dgm:pt>
     <dgm:pt modelId="{451F3664-1887-4073-8260-9FC7F369F14A}">
       <dgm:prSet phldrT="[Text]" custT="1"/>
-      <dgm:spPr/>
+      <dgm:spPr>
+        <a:solidFill>
+          <a:srgbClr val="CCC6E2"/>
+        </a:solidFill>
+        <a:ln w="12700" cap="flat" cmpd="sng" algn="ctr">
+          <a:solidFill>
+            <a:prstClr val="black">
+              <a:shade val="80000"/>
+              <a:hueOff val="0"/>
+              <a:satOff val="0"/>
+              <a:lumOff val="0"/>
+              <a:alphaOff val="0"/>
+            </a:prstClr>
+          </a:solidFill>
+          <a:prstDash val="solid"/>
+          <a:miter lim="800000"/>
+        </a:ln>
+        <a:effectLst/>
+      </dgm:spPr>
       <dgm:t>
-        <a:bodyPr/>
+        <a:bodyPr spcFirstLastPara="0" vert="horz" wrap="square" lIns="38100" tIns="38100" rIns="38100" bIns="38100" numCol="1" spcCol="1270" anchor="ctr" anchorCtr="0"/>
         <a:lstStyle/>
         <a:p>
           <a:r>
-            <a:rPr lang="en-US" sz="1500" b="1" dirty="0">
+            <a:rPr lang="en-US" sz="1400" b="0" kern="1200" dirty="0">
               <a:latin typeface="Bodoni MT" panose="02070603080606020203" pitchFamily="18" charset="0"/>
             </a:rPr>
-            <a:t>610</a:t>
+            <a:t>Reports assessed for </a:t>
           </a:r>
           <a:r>
-            <a:rPr lang="en-US" sz="1000" dirty="0">
+            <a:rPr lang="en-US" sz="1400" b="0" kern="1200" dirty="0">
+              <a:solidFill>
+                <a:prstClr val="black">
+                  <a:hueOff val="0"/>
+                  <a:satOff val="0"/>
+                  <a:lumOff val="0"/>
+                  <a:alphaOff val="0"/>
+                </a:prstClr>
+              </a:solidFill>
+              <a:latin typeface="Bodoni MT" panose="02070603080606020203" pitchFamily="18" charset="0"/>
+              <a:ea typeface="+mn-ea"/>
+              <a:cs typeface="+mn-cs"/>
+            </a:rPr>
+            <a:t>eligibility</a:t>
+          </a:r>
+          <a:r>
+            <a:rPr lang="en-US" sz="1400" b="0" kern="1200" dirty="0">
               <a:latin typeface="Bodoni MT" panose="02070603080606020203" pitchFamily="18" charset="0"/>
             </a:rPr>
-            <a:t> </a:t>
+            <a:t> (n=610)</a:t>
           </a:r>
         </a:p>
         <a:p>
           <a:r>
-            <a:rPr lang="en-US" sz="1000" dirty="0">
+            <a:rPr lang="en-US" sz="1400" b="0" kern="1200" dirty="0">
               <a:latin typeface="Bodoni MT" panose="02070603080606020203" pitchFamily="18" charset="0"/>
             </a:rPr>
-            <a:t>studies assessed for full-text eligibility</a:t>
+            <a:t> </a:t>
           </a:r>
         </a:p>
       </dgm:t>
@@ -1188,71 +1182,20 @@
         <a:bodyPr/>
         <a:lstStyle/>
         <a:p>
-          <a:endParaRPr lang="en-US" sz="1000">
+          <a:endParaRPr lang="en-US" sz="1400" b="0">
             <a:latin typeface="Bodoni MT" panose="02070603080606020203" pitchFamily="18" charset="0"/>
           </a:endParaRPr>
         </a:p>
       </dgm:t>
     </dgm:pt>
     <dgm:pt modelId="{A8717F28-0542-4C60-9012-FED06B218414}" type="sibTrans" cxnId="{309C8A64-A122-4CD9-83C7-8A542092252A}">
-      <dgm:prSet/>
+      <dgm:prSet custT="1"/>
       <dgm:spPr/>
       <dgm:t>
         <a:bodyPr/>
         <a:lstStyle/>
         <a:p>
-          <a:endParaRPr lang="en-US" sz="1000">
-            <a:latin typeface="Bodoni MT" panose="02070603080606020203" pitchFamily="18" charset="0"/>
-          </a:endParaRPr>
-        </a:p>
-      </dgm:t>
-    </dgm:pt>
-    <dgm:pt modelId="{BA0E5C66-AD95-4EC1-BB57-CA5D431D8EAA}">
-      <dgm:prSet phldrT="[Text]" custT="1"/>
-      <dgm:spPr/>
-      <dgm:t>
-        <a:bodyPr/>
-        <a:lstStyle/>
-        <a:p>
-          <a:pPr>
-            <a:buNone/>
-          </a:pPr>
-          <a:r>
-            <a:rPr lang="en-US" sz="1000" b="1" dirty="0">
-              <a:latin typeface="Bodoni MT" panose="02070603080606020203" pitchFamily="18" charset="0"/>
-            </a:rPr>
-            <a:t>160</a:t>
-          </a:r>
-          <a:r>
-            <a:rPr lang="en-US" sz="1000" dirty="0">
-              <a:latin typeface="Bodoni MT" panose="02070603080606020203" pitchFamily="18" charset="0"/>
-            </a:rPr>
-            <a:t> studies excluded, thereof</a:t>
-          </a:r>
-        </a:p>
-      </dgm:t>
-    </dgm:pt>
-    <dgm:pt modelId="{B92605C3-A23A-4F34-85AC-7BF68405C28E}" type="parTrans" cxnId="{6DEE07D7-629B-44E6-A853-E6B13AAF81E7}">
-      <dgm:prSet/>
-      <dgm:spPr/>
-      <dgm:t>
-        <a:bodyPr/>
-        <a:lstStyle/>
-        <a:p>
-          <a:endParaRPr lang="en-US" sz="1000">
-            <a:latin typeface="Bodoni MT" panose="02070603080606020203" pitchFamily="18" charset="0"/>
-          </a:endParaRPr>
-        </a:p>
-      </dgm:t>
-    </dgm:pt>
-    <dgm:pt modelId="{15BAEAF5-FD6B-4205-808F-F6655484FC4A}" type="sibTrans" cxnId="{6DEE07D7-629B-44E6-A853-E6B13AAF81E7}">
-      <dgm:prSet/>
-      <dgm:spPr/>
-      <dgm:t>
-        <a:bodyPr/>
-        <a:lstStyle/>
-        <a:p>
-          <a:endParaRPr lang="en-US" sz="1000">
+          <a:endParaRPr lang="en-US" sz="1400" b="0">
             <a:latin typeface="Bodoni MT" panose="02070603080606020203" pitchFamily="18" charset="0"/>
           </a:endParaRPr>
         </a:p>
@@ -1260,27 +1203,86 @@
     </dgm:pt>
     <dgm:pt modelId="{4415FC87-F301-4E23-B07B-6D9238A4755B}">
       <dgm:prSet custT="1"/>
-      <dgm:spPr/>
+      <dgm:spPr>
+        <a:solidFill>
+          <a:srgbClr val="CCC6E2"/>
+        </a:solidFill>
+        <a:ln w="12700" cap="flat" cmpd="sng" algn="ctr">
+          <a:solidFill>
+            <a:prstClr val="black">
+              <a:shade val="80000"/>
+              <a:hueOff val="0"/>
+              <a:satOff val="0"/>
+              <a:lumOff val="0"/>
+              <a:alphaOff val="0"/>
+            </a:prstClr>
+          </a:solidFill>
+          <a:prstDash val="solid"/>
+          <a:miter lim="800000"/>
+        </a:ln>
+        <a:effectLst/>
+      </dgm:spPr>
       <dgm:t>
-        <a:bodyPr/>
+        <a:bodyPr spcFirstLastPara="0" vert="horz" wrap="square" lIns="38100" tIns="38100" rIns="38100" bIns="38100" numCol="1" spcCol="1270" anchor="ctr" anchorCtr="0"/>
         <a:lstStyle/>
         <a:p>
+          <a:pPr marL="0" lvl="0" algn="ctr" defTabSz="444500">
+            <a:lnSpc>
+              <a:spcPct val="90000"/>
+            </a:lnSpc>
+            <a:spcBef>
+              <a:spcPct val="0"/>
+            </a:spcBef>
+            <a:spcAft>
+              <a:spcPct val="35000"/>
+            </a:spcAft>
+            <a:buNone/>
+          </a:pPr>
           <a:r>
-            <a:rPr lang="en-US" sz="1500" b="1" dirty="0">
+            <a:rPr lang="en-US" sz="1400" b="0" kern="1200" dirty="0">
+              <a:solidFill>
+                <a:prstClr val="black">
+                  <a:hueOff val="0"/>
+                  <a:satOff val="0"/>
+                  <a:lumOff val="0"/>
+                  <a:alphaOff val="0"/>
+                </a:prstClr>
+              </a:solidFill>
               <a:latin typeface="Bodoni MT" panose="02070603080606020203" pitchFamily="18" charset="0"/>
+              <a:ea typeface="+mn-ea"/>
+              <a:cs typeface="+mn-cs"/>
             </a:rPr>
-            <a:t>450</a:t>
+            <a:t>Reports of new included studies</a:t>
           </a:r>
-          <a:endParaRPr lang="en-US" sz="1500" dirty="0">
-            <a:latin typeface="Bodoni MT" panose="02070603080606020203" pitchFamily="18" charset="0"/>
-          </a:endParaRPr>
         </a:p>
         <a:p>
+          <a:pPr marL="0" lvl="0" algn="ctr" defTabSz="444500">
+            <a:lnSpc>
+              <a:spcPct val="90000"/>
+            </a:lnSpc>
+            <a:spcBef>
+              <a:spcPct val="0"/>
+            </a:spcBef>
+            <a:spcAft>
+              <a:spcPct val="35000"/>
+            </a:spcAft>
+            <a:buNone/>
+          </a:pPr>
           <a:r>
-            <a:rPr lang="en-US" sz="1000" dirty="0">
+            <a:rPr lang="en-US" sz="1400" b="0" kern="1200" dirty="0">
+              <a:solidFill>
+                <a:prstClr val="black">
+                  <a:hueOff val="0"/>
+                  <a:satOff val="0"/>
+                  <a:lumOff val="0"/>
+                  <a:alphaOff val="0"/>
+                </a:prstClr>
+              </a:solidFill>
               <a:latin typeface="Bodoni MT" panose="02070603080606020203" pitchFamily="18" charset="0"/>
+              <a:ea typeface="+mn-ea"/>
+              <a:cs typeface="+mn-cs"/>
             </a:rPr>
-            <a:t>studies included</a:t>
+            <a:t>(n=450)</a:t>
           </a:r>
         </a:p>
       </dgm:t>
@@ -1292,7 +1294,7 @@
         <a:bodyPr/>
         <a:lstStyle/>
         <a:p>
-          <a:endParaRPr lang="en-US" sz="1000">
+          <a:endParaRPr lang="en-US" sz="1400" b="0">
             <a:latin typeface="Bodoni MT" panose="02070603080606020203" pitchFamily="18" charset="0"/>
           </a:endParaRPr>
         </a:p>
@@ -1305,347 +1307,133 @@
         <a:bodyPr/>
         <a:lstStyle/>
         <a:p>
-          <a:endParaRPr lang="en-US" sz="1000">
+          <a:endParaRPr lang="en-US" sz="1400" b="0">
             <a:latin typeface="Bodoni MT" panose="02070603080606020203" pitchFamily="18" charset="0"/>
           </a:endParaRPr>
         </a:p>
       </dgm:t>
     </dgm:pt>
-    <dgm:pt modelId="{1C00C57B-09A8-48C7-B8A9-DE36F8114CA6}">
-      <dgm:prSet custT="1"/>
-      <dgm:spPr/>
-      <dgm:t>
-        <a:bodyPr/>
-        <a:lstStyle/>
-        <a:p>
-          <a:pPr>
-            <a:buFont typeface="Arial" panose="020B0604020202020204" pitchFamily="34" charset="0"/>
-            <a:buChar char="•"/>
-          </a:pPr>
-          <a:r>
-            <a:rPr lang="en-US" sz="1000" b="1" dirty="0">
-              <a:latin typeface="Bodoni MT" panose="02070603080606020203" pitchFamily="18" charset="0"/>
-            </a:rPr>
-            <a:t>64</a:t>
-          </a:r>
-          <a:r>
-            <a:rPr lang="en-US" sz="1000" dirty="0">
-              <a:latin typeface="Bodoni MT" panose="02070603080606020203" pitchFamily="18" charset="0"/>
-            </a:rPr>
-            <a:t>  No XAI method provided, </a:t>
-          </a:r>
-        </a:p>
-      </dgm:t>
-    </dgm:pt>
-    <dgm:pt modelId="{90B4DAE8-6266-42BE-9DA7-077CD5BBBF48}" type="parTrans" cxnId="{A4E814D0-8862-4299-98CF-68FFCBA2E5A0}">
-      <dgm:prSet/>
-      <dgm:spPr/>
-      <dgm:t>
-        <a:bodyPr/>
-        <a:lstStyle/>
-        <a:p>
-          <a:endParaRPr lang="en-US" sz="1000"/>
-        </a:p>
-      </dgm:t>
-    </dgm:pt>
-    <dgm:pt modelId="{B9D406AC-27CE-462C-92C6-55B750958BFB}" type="sibTrans" cxnId="{A4E814D0-8862-4299-98CF-68FFCBA2E5A0}">
-      <dgm:prSet/>
-      <dgm:spPr/>
-      <dgm:t>
-        <a:bodyPr/>
-        <a:lstStyle/>
-        <a:p>
-          <a:endParaRPr lang="en-US" sz="1000"/>
-        </a:p>
-      </dgm:t>
-    </dgm:pt>
-    <dgm:pt modelId="{72F1CBC3-2662-408F-B829-3AB20F6D1B39}">
-      <dgm:prSet custT="1"/>
-      <dgm:spPr/>
-      <dgm:t>
-        <a:bodyPr/>
-        <a:lstStyle/>
-        <a:p>
-          <a:pPr>
-            <a:buFont typeface="Arial" panose="020B0604020202020204" pitchFamily="34" charset="0"/>
-            <a:buChar char="•"/>
-          </a:pPr>
-          <a:r>
-            <a:rPr lang="en-US" sz="1000" b="1" dirty="0">
-              <a:latin typeface="Bodoni MT" panose="02070603080606020203" pitchFamily="18" charset="0"/>
-            </a:rPr>
-            <a:t>13</a:t>
-          </a:r>
-          <a:r>
-            <a:rPr lang="en-US" sz="1000" dirty="0">
-              <a:latin typeface="Bodoni MT" panose="02070603080606020203" pitchFamily="18" charset="0"/>
-            </a:rPr>
-            <a:t>  No tabular or image data as input</a:t>
-          </a:r>
-        </a:p>
-      </dgm:t>
-    </dgm:pt>
-    <dgm:pt modelId="{589EDF95-0FD0-4016-9577-A50B634C599B}" type="parTrans" cxnId="{34E94D19-7711-4EBD-98ED-CD4A4AE1215C}">
-      <dgm:prSet/>
-      <dgm:spPr/>
-      <dgm:t>
-        <a:bodyPr/>
-        <a:lstStyle/>
-        <a:p>
-          <a:endParaRPr lang="en-US" sz="1000"/>
-        </a:p>
-      </dgm:t>
-    </dgm:pt>
-    <dgm:pt modelId="{2FFE5271-F14E-4EC2-96C2-3C4842409D9C}" type="sibTrans" cxnId="{34E94D19-7711-4EBD-98ED-CD4A4AE1215C}">
-      <dgm:prSet/>
-      <dgm:spPr/>
-      <dgm:t>
-        <a:bodyPr/>
-        <a:lstStyle/>
-        <a:p>
-          <a:endParaRPr lang="en-US" sz="1000"/>
-        </a:p>
-      </dgm:t>
-    </dgm:pt>
-    <dgm:pt modelId="{D06C8E07-8815-4701-B198-F439D609E3C3}">
-      <dgm:prSet custT="1"/>
-      <dgm:spPr/>
-      <dgm:t>
-        <a:bodyPr/>
-        <a:lstStyle/>
-        <a:p>
-          <a:pPr>
-            <a:buNone/>
-          </a:pPr>
-          <a:r>
-            <a:rPr lang="en-US" sz="1000" dirty="0">
-              <a:latin typeface="Bodoni MT" panose="02070603080606020203" pitchFamily="18" charset="0"/>
-            </a:rPr>
-            <a:t>(Multiple reasons possible)</a:t>
-          </a:r>
-        </a:p>
-      </dgm:t>
-    </dgm:pt>
-    <dgm:pt modelId="{FEDE4E08-1D68-4E9E-B5C2-86D9200E114C}" type="parTrans" cxnId="{43B2DFB0-2346-4FD8-A96F-BAE4D5415506}">
-      <dgm:prSet/>
-      <dgm:spPr/>
-      <dgm:t>
-        <a:bodyPr/>
-        <a:lstStyle/>
-        <a:p>
-          <a:endParaRPr lang="en-US" sz="1000"/>
-        </a:p>
-      </dgm:t>
-    </dgm:pt>
-    <dgm:pt modelId="{D4EBCC1F-783E-404F-B194-608BCDCE072E}" type="sibTrans" cxnId="{43B2DFB0-2346-4FD8-A96F-BAE4D5415506}">
-      <dgm:prSet/>
-      <dgm:spPr/>
-      <dgm:t>
-        <a:bodyPr/>
-        <a:lstStyle/>
-        <a:p>
-          <a:endParaRPr lang="en-US" sz="1000"/>
-        </a:p>
-      </dgm:t>
-    </dgm:pt>
-    <dgm:pt modelId="{8A7F15CD-CC47-48FD-BEBB-8E2D11911FDC}">
-      <dgm:prSet phldrT="[Text]" custT="1"/>
-      <dgm:spPr/>
-      <dgm:t>
-        <a:bodyPr/>
-        <a:lstStyle/>
-        <a:p>
-          <a:pPr>
-            <a:buFont typeface="Arial" panose="020B0604020202020204" pitchFamily="34" charset="0"/>
-            <a:buChar char="•"/>
-          </a:pPr>
-          <a:r>
-            <a:rPr lang="en-US" sz="1000" b="1" dirty="0">
-              <a:latin typeface="Bodoni MT" panose="02070603080606020203" pitchFamily="18" charset="0"/>
-            </a:rPr>
-            <a:t>87</a:t>
-          </a:r>
-          <a:r>
-            <a:rPr lang="en-US" sz="1000" dirty="0">
-              <a:latin typeface="Bodoni MT" panose="02070603080606020203" pitchFamily="18" charset="0"/>
-            </a:rPr>
-            <a:t>  with no concrete medical supervised ML use case, </a:t>
-          </a:r>
-        </a:p>
-      </dgm:t>
-    </dgm:pt>
-    <dgm:pt modelId="{78318525-234F-44AD-974A-2F1750BFD94C}" type="parTrans" cxnId="{60CC474B-D604-4603-AFF2-D23D497AA059}">
-      <dgm:prSet/>
-      <dgm:spPr/>
-      <dgm:t>
-        <a:bodyPr/>
-        <a:lstStyle/>
-        <a:p>
-          <a:endParaRPr lang="en-US" sz="1000"/>
-        </a:p>
-      </dgm:t>
-    </dgm:pt>
-    <dgm:pt modelId="{A3A1A86E-C960-4103-8274-7E7D4EE4A807}" type="sibTrans" cxnId="{60CC474B-D604-4603-AFF2-D23D497AA059}">
-      <dgm:prSet/>
-      <dgm:spPr/>
-      <dgm:t>
-        <a:bodyPr/>
-        <a:lstStyle/>
-        <a:p>
-          <a:endParaRPr lang="en-US" sz="1000"/>
-        </a:p>
-      </dgm:t>
-    </dgm:pt>
-    <dgm:pt modelId="{A0F5CC64-861A-46AA-B269-382CDFDC589A}" type="pres">
-      <dgm:prSet presAssocID="{81415F0E-C1C2-4430-B6A7-F2FFAC97A734}" presName="Name0" presStyleCnt="0">
+    <dgm:pt modelId="{9E94C703-8723-6A43-B4FE-04EF0E78C76E}" type="pres">
+      <dgm:prSet presAssocID="{81415F0E-C1C2-4430-B6A7-F2FFAC97A734}" presName="linearFlow" presStyleCnt="0">
         <dgm:presLayoutVars>
-          <dgm:dir/>
-          <dgm:animLvl val="lvl"/>
           <dgm:resizeHandles val="exact"/>
         </dgm:presLayoutVars>
       </dgm:prSet>
       <dgm:spPr/>
     </dgm:pt>
-    <dgm:pt modelId="{17D54155-BDE3-4898-8012-740F6D9240EB}" type="pres">
-      <dgm:prSet presAssocID="{358238D7-E74F-4423-A94B-B71561329738}" presName="composite" presStyleCnt="0"/>
-      <dgm:spPr/>
-    </dgm:pt>
-    <dgm:pt modelId="{2E353FD0-8725-4E46-81FD-785B1452EF3C}" type="pres">
-      <dgm:prSet presAssocID="{358238D7-E74F-4423-A94B-B71561329738}" presName="parTx" presStyleLbl="node1" presStyleIdx="0" presStyleCnt="4">
-        <dgm:presLayoutVars>
-          <dgm:chMax val="0"/>
-          <dgm:chPref val="0"/>
-          <dgm:bulletEnabled val="1"/>
-        </dgm:presLayoutVars>
-      </dgm:prSet>
-      <dgm:spPr/>
-    </dgm:pt>
-    <dgm:pt modelId="{44775C42-43C7-4EF0-8CD8-7C9BB12B60B9}" type="pres">
-      <dgm:prSet presAssocID="{358238D7-E74F-4423-A94B-B71561329738}" presName="desTx" presStyleLbl="revTx" presStyleIdx="0" presStyleCnt="3">
+    <dgm:pt modelId="{36D7FCA5-5093-774F-9025-60569732EB45}" type="pres">
+      <dgm:prSet presAssocID="{358238D7-E74F-4423-A94B-B71561329738}" presName="node" presStyleLbl="node1" presStyleIdx="0" presStyleCnt="4" custScaleX="116065">
         <dgm:presLayoutVars>
           <dgm:bulletEnabled val="1"/>
         </dgm:presLayoutVars>
       </dgm:prSet>
       <dgm:spPr/>
     </dgm:pt>
-    <dgm:pt modelId="{E4A43304-2424-43C0-AB3D-12F28BFD7CF0}" type="pres">
-      <dgm:prSet presAssocID="{86B24066-FA7B-44F6-9E1C-A634C0C9EF7C}" presName="space" presStyleCnt="0"/>
+    <dgm:pt modelId="{998B3E43-74E7-FA47-B216-32E43307E41A}" type="pres">
+      <dgm:prSet presAssocID="{86B24066-FA7B-44F6-9E1C-A634C0C9EF7C}" presName="sibTrans" presStyleLbl="sibTrans2D1" presStyleIdx="0" presStyleCnt="3"/>
       <dgm:spPr/>
     </dgm:pt>
-    <dgm:pt modelId="{81B13589-9795-4CED-BC66-ADD8B83AA9AB}" type="pres">
-      <dgm:prSet presAssocID="{5E813B8B-CA9F-4A4A-A827-6EF1EC5201C8}" presName="composite" presStyleCnt="0"/>
+    <dgm:pt modelId="{0DE0BEA9-A054-0644-8D2F-F76457BEE503}" type="pres">
+      <dgm:prSet presAssocID="{86B24066-FA7B-44F6-9E1C-A634C0C9EF7C}" presName="connectorText" presStyleLbl="sibTrans2D1" presStyleIdx="0" presStyleCnt="3"/>
       <dgm:spPr/>
     </dgm:pt>
-    <dgm:pt modelId="{6AD8E2FC-2F34-4626-B833-B4159B4A12FD}" type="pres">
-      <dgm:prSet presAssocID="{5E813B8B-CA9F-4A4A-A827-6EF1EC5201C8}" presName="parTx" presStyleLbl="node1" presStyleIdx="1" presStyleCnt="4">
-        <dgm:presLayoutVars>
-          <dgm:chMax val="0"/>
-          <dgm:chPref val="0"/>
-          <dgm:bulletEnabled val="1"/>
-        </dgm:presLayoutVars>
-      </dgm:prSet>
-      <dgm:spPr/>
-    </dgm:pt>
-    <dgm:pt modelId="{320F41EA-40D2-44B1-A8BB-F1810F26A736}" type="pres">
-      <dgm:prSet presAssocID="{5E813B8B-CA9F-4A4A-A827-6EF1EC5201C8}" presName="desTx" presStyleLbl="revTx" presStyleIdx="1" presStyleCnt="3">
+    <dgm:pt modelId="{42546C1D-91CB-704F-BB46-EA6F4F49ABDE}" type="pres">
+      <dgm:prSet presAssocID="{5E813B8B-CA9F-4A4A-A827-6EF1EC5201C8}" presName="node" presStyleLbl="node1" presStyleIdx="1" presStyleCnt="4" custScaleX="114146">
         <dgm:presLayoutVars>
           <dgm:bulletEnabled val="1"/>
         </dgm:presLayoutVars>
       </dgm:prSet>
+      <dgm:spPr>
+        <a:xfrm>
+          <a:off x="1223834" y="1361484"/>
+          <a:ext cx="1861560" cy="906032"/>
+        </a:xfrm>
+        <a:prstGeom prst="roundRect">
+          <a:avLst>
+            <a:gd name="adj" fmla="val 10000"/>
+          </a:avLst>
+        </a:prstGeom>
+      </dgm:spPr>
+    </dgm:pt>
+    <dgm:pt modelId="{4C4E68B0-E783-2E46-83EC-65154D1F809A}" type="pres">
+      <dgm:prSet presAssocID="{39F5DBEC-F85A-4BE9-B98B-3C9A98243099}" presName="sibTrans" presStyleLbl="sibTrans2D1" presStyleIdx="1" presStyleCnt="3"/>
       <dgm:spPr/>
     </dgm:pt>
-    <dgm:pt modelId="{9B7B86CF-3B34-4A3A-A9F2-59F4AB2F740D}" type="pres">
-      <dgm:prSet presAssocID="{39F5DBEC-F85A-4BE9-B98B-3C9A98243099}" presName="space" presStyleCnt="0"/>
+    <dgm:pt modelId="{30C0D766-2E2D-2D44-8131-3D3E28D05CDE}" type="pres">
+      <dgm:prSet presAssocID="{39F5DBEC-F85A-4BE9-B98B-3C9A98243099}" presName="connectorText" presStyleLbl="sibTrans2D1" presStyleIdx="1" presStyleCnt="3"/>
       <dgm:spPr/>
     </dgm:pt>
-    <dgm:pt modelId="{5E59267D-5F3C-4861-9258-DE1D30A1AEFE}" type="pres">
-      <dgm:prSet presAssocID="{451F3664-1887-4073-8260-9FC7F369F14A}" presName="composite" presStyleCnt="0"/>
-      <dgm:spPr/>
-    </dgm:pt>
-    <dgm:pt modelId="{DD430E24-DEDA-4284-936A-5749872894DD}" type="pres">
-      <dgm:prSet presAssocID="{451F3664-1887-4073-8260-9FC7F369F14A}" presName="parTx" presStyleLbl="node1" presStyleIdx="2" presStyleCnt="4">
-        <dgm:presLayoutVars>
-          <dgm:chMax val="0"/>
-          <dgm:chPref val="0"/>
-          <dgm:bulletEnabled val="1"/>
-        </dgm:presLayoutVars>
-      </dgm:prSet>
-      <dgm:spPr/>
-    </dgm:pt>
-    <dgm:pt modelId="{B0F6D67C-D3C7-46BE-A9C8-F0A63B37CC55}" type="pres">
-      <dgm:prSet presAssocID="{451F3664-1887-4073-8260-9FC7F369F14A}" presName="desTx" presStyleLbl="revTx" presStyleIdx="2" presStyleCnt="3">
+    <dgm:pt modelId="{17DBAB15-4315-D944-88A4-D49FE0A0DF65}" type="pres">
+      <dgm:prSet presAssocID="{451F3664-1887-4073-8260-9FC7F369F14A}" presName="node" presStyleLbl="node1" presStyleIdx="2" presStyleCnt="4" custScaleX="113187">
         <dgm:presLayoutVars>
           <dgm:bulletEnabled val="1"/>
         </dgm:presLayoutVars>
       </dgm:prSet>
+      <dgm:spPr>
+        <a:xfrm>
+          <a:off x="1231654" y="2720534"/>
+          <a:ext cx="1845920" cy="906032"/>
+        </a:xfrm>
+        <a:prstGeom prst="roundRect">
+          <a:avLst>
+            <a:gd name="adj" fmla="val 10000"/>
+          </a:avLst>
+        </a:prstGeom>
+      </dgm:spPr>
+    </dgm:pt>
+    <dgm:pt modelId="{0DABD85C-2D8D-7F4D-A11A-D342C13706A4}" type="pres">
+      <dgm:prSet presAssocID="{A8717F28-0542-4C60-9012-FED06B218414}" presName="sibTrans" presStyleLbl="sibTrans2D1" presStyleIdx="2" presStyleCnt="3"/>
       <dgm:spPr/>
     </dgm:pt>
-    <dgm:pt modelId="{01CAE392-3156-4B32-8352-0616DE0E4AFB}" type="pres">
-      <dgm:prSet presAssocID="{A8717F28-0542-4C60-9012-FED06B218414}" presName="space" presStyleCnt="0"/>
+    <dgm:pt modelId="{E4CCA192-D324-544C-B0EA-AB7BB4785F98}" type="pres">
+      <dgm:prSet presAssocID="{A8717F28-0542-4C60-9012-FED06B218414}" presName="connectorText" presStyleLbl="sibTrans2D1" presStyleIdx="2" presStyleCnt="3"/>
       <dgm:spPr/>
     </dgm:pt>
-    <dgm:pt modelId="{225B8223-0F78-4FE0-88CC-757FAC0F824B}" type="pres">
-      <dgm:prSet presAssocID="{4415FC87-F301-4E23-B07B-6D9238A4755B}" presName="composite" presStyleCnt="0"/>
-      <dgm:spPr/>
-    </dgm:pt>
-    <dgm:pt modelId="{63E9F576-8E68-4A72-948C-B213FB07D931}" type="pres">
-      <dgm:prSet presAssocID="{4415FC87-F301-4E23-B07B-6D9238A4755B}" presName="parTx" presStyleLbl="node1" presStyleIdx="3" presStyleCnt="4">
-        <dgm:presLayoutVars>
-          <dgm:chMax val="0"/>
-          <dgm:chPref val="0"/>
-          <dgm:bulletEnabled val="1"/>
-        </dgm:presLayoutVars>
-      </dgm:prSet>
-      <dgm:spPr/>
-    </dgm:pt>
-    <dgm:pt modelId="{A9303683-6229-4CDE-A155-6951C3081FF6}" type="pres">
-      <dgm:prSet presAssocID="{4415FC87-F301-4E23-B07B-6D9238A4755B}" presName="desTx" presStyleLbl="revTx" presStyleIdx="2" presStyleCnt="3">
+    <dgm:pt modelId="{4331F363-51FD-3A41-8B71-DF8ADF4A8B9F}" type="pres">
+      <dgm:prSet presAssocID="{4415FC87-F301-4E23-B07B-6D9238A4755B}" presName="node" presStyleLbl="node1" presStyleIdx="3" presStyleCnt="4" custScaleX="113187">
         <dgm:presLayoutVars>
           <dgm:bulletEnabled val="1"/>
         </dgm:presLayoutVars>
       </dgm:prSet>
-      <dgm:spPr/>
+      <dgm:spPr>
+        <a:xfrm>
+          <a:off x="1231654" y="4079583"/>
+          <a:ext cx="1845920" cy="906032"/>
+        </a:xfrm>
+        <a:prstGeom prst="roundRect">
+          <a:avLst>
+            <a:gd name="adj" fmla="val 10000"/>
+          </a:avLst>
+        </a:prstGeom>
+      </dgm:spPr>
     </dgm:pt>
   </dgm:ptLst>
   <dgm:cxnLst>
-    <dgm:cxn modelId="{2B62590B-0996-4DFB-A03C-71E97A3E4D41}" type="presOf" srcId="{E77E0608-80C9-4293-8CD2-6B04DE83409C}" destId="{44775C42-43C7-4EF0-8CD8-7C9BB12B60B9}" srcOrd="0" destOrd="0" presId="urn:microsoft.com/office/officeart/2005/8/layout/chevron1"/>
-    <dgm:cxn modelId="{34E94D19-7711-4EBD-98ED-CD4A4AE1215C}" srcId="{451F3664-1887-4073-8260-9FC7F369F14A}" destId="{72F1CBC3-2662-408F-B829-3AB20F6D1B39}" srcOrd="3" destOrd="0" parTransId="{589EDF95-0FD0-4016-9577-A50B634C599B}" sibTransId="{2FFE5271-F14E-4EC2-96C2-3C4842409D9C}"/>
-    <dgm:cxn modelId="{7181DA19-701A-4BC8-B0E7-95176793AA6A}" type="presOf" srcId="{4415FC87-F301-4E23-B07B-6D9238A4755B}" destId="{63E9F576-8E68-4A72-948C-B213FB07D931}" srcOrd="0" destOrd="0" presId="urn:microsoft.com/office/officeart/2005/8/layout/chevron1"/>
+    <dgm:cxn modelId="{FF052811-EC09-B443-A2EC-92D35A258583}" type="presOf" srcId="{5E813B8B-CA9F-4A4A-A827-6EF1EC5201C8}" destId="{42546C1D-91CB-704F-BB46-EA6F4F49ABDE}" srcOrd="0" destOrd="0" presId="urn:microsoft.com/office/officeart/2005/8/layout/process2"/>
+    <dgm:cxn modelId="{6BF41817-2481-EC4E-8049-C177BFA90142}" type="presOf" srcId="{358238D7-E74F-4423-A94B-B71561329738}" destId="{36D7FCA5-5093-774F-9025-60569732EB45}" srcOrd="0" destOrd="0" presId="urn:microsoft.com/office/officeart/2005/8/layout/process2"/>
+    <dgm:cxn modelId="{738DE51D-0FEE-4943-A7B2-CC357FA5ABF8}" type="presOf" srcId="{39F5DBEC-F85A-4BE9-B98B-3C9A98243099}" destId="{30C0D766-2E2D-2D44-8131-3D3E28D05CDE}" srcOrd="1" destOrd="0" presId="urn:microsoft.com/office/officeart/2005/8/layout/process2"/>
     <dgm:cxn modelId="{5BCA4328-2E72-4572-8A65-1B09192BB03C}" srcId="{81415F0E-C1C2-4430-B6A7-F2FFAC97A734}" destId="{5E813B8B-CA9F-4A4A-A827-6EF1EC5201C8}" srcOrd="1" destOrd="0" parTransId="{58DCE214-FC8C-4EE0-9B43-C9BB31836B74}" sibTransId="{39F5DBEC-F85A-4BE9-B98B-3C9A98243099}"/>
-    <dgm:cxn modelId="{5A336B28-242C-480D-9A9E-29E0F72E7728}" srcId="{5E813B8B-CA9F-4A4A-A827-6EF1EC5201C8}" destId="{8D0365F7-453A-4002-9948-18E5EB6DC029}" srcOrd="0" destOrd="0" parTransId="{07BFB033-D595-4D91-885A-773D6F2CD47B}" sibTransId="{896D9EBE-8E33-4CD7-BD2C-10BC27DAF13E}"/>
-    <dgm:cxn modelId="{5CFA663D-CE17-47B5-9D20-28FA38EDC386}" type="presOf" srcId="{451F3664-1887-4073-8260-9FC7F369F14A}" destId="{DD430E24-DEDA-4284-936A-5749872894DD}" srcOrd="0" destOrd="0" presId="urn:microsoft.com/office/officeart/2005/8/layout/chevron1"/>
-    <dgm:cxn modelId="{D4F3E93F-E668-4379-A520-37C400B2EC50}" type="presOf" srcId="{72F1CBC3-2662-408F-B829-3AB20F6D1B39}" destId="{B0F6D67C-D3C7-46BE-A9C8-F0A63B37CC55}" srcOrd="0" destOrd="3" presId="urn:microsoft.com/office/officeart/2005/8/layout/chevron1"/>
+    <dgm:cxn modelId="{D138AE2A-D470-C542-9426-24D53095C244}" type="presOf" srcId="{39F5DBEC-F85A-4BE9-B98B-3C9A98243099}" destId="{4C4E68B0-E783-2E46-83EC-65154D1F809A}" srcOrd="0" destOrd="0" presId="urn:microsoft.com/office/officeart/2005/8/layout/process2"/>
+    <dgm:cxn modelId="{8E73E64A-E520-F14F-80CF-117F91A3B785}" type="presOf" srcId="{86B24066-FA7B-44F6-9E1C-A634C0C9EF7C}" destId="{998B3E43-74E7-FA47-B216-32E43307E41A}" srcOrd="0" destOrd="0" presId="urn:microsoft.com/office/officeart/2005/8/layout/process2"/>
     <dgm:cxn modelId="{309C8A64-A122-4CD9-83C7-8A542092252A}" srcId="{81415F0E-C1C2-4430-B6A7-F2FFAC97A734}" destId="{451F3664-1887-4073-8260-9FC7F369F14A}" srcOrd="2" destOrd="0" parTransId="{EFD6ADAF-18A5-4F29-8409-B7C6B60F1877}" sibTransId="{A8717F28-0542-4C60-9012-FED06B218414}"/>
-    <dgm:cxn modelId="{32F41D4B-C160-4DE0-8CAF-C73875D6B63D}" type="presOf" srcId="{5E813B8B-CA9F-4A4A-A827-6EF1EC5201C8}" destId="{6AD8E2FC-2F34-4626-B833-B4159B4A12FD}" srcOrd="0" destOrd="0" presId="urn:microsoft.com/office/officeart/2005/8/layout/chevron1"/>
-    <dgm:cxn modelId="{60CC474B-D604-4603-AFF2-D23D497AA059}" srcId="{451F3664-1887-4073-8260-9FC7F369F14A}" destId="{8A7F15CD-CC47-48FD-BEBB-8E2D11911FDC}" srcOrd="1" destOrd="0" parTransId="{78318525-234F-44AD-974A-2F1750BFD94C}" sibTransId="{A3A1A86E-C960-4103-8274-7E7D4EE4A807}"/>
-    <dgm:cxn modelId="{9152DF54-5F41-4F4D-8B9A-BE06F886FCED}" type="presOf" srcId="{81415F0E-C1C2-4430-B6A7-F2FFAC97A734}" destId="{A0F5CC64-861A-46AA-B269-382CDFDC589A}" srcOrd="0" destOrd="0" presId="urn:microsoft.com/office/officeart/2005/8/layout/chevron1"/>
-    <dgm:cxn modelId="{2D6EDF5A-C228-4D5C-92B0-50EE215B5279}" type="presOf" srcId="{358238D7-E74F-4423-A94B-B71561329738}" destId="{2E353FD0-8725-4E46-81FD-785B1452EF3C}" srcOrd="0" destOrd="0" presId="urn:microsoft.com/office/officeart/2005/8/layout/chevron1"/>
-    <dgm:cxn modelId="{1C115483-7993-42BF-8DB7-8EDD89F39C96}" type="presOf" srcId="{D06C8E07-8815-4701-B198-F439D609E3C3}" destId="{B0F6D67C-D3C7-46BE-A9C8-F0A63B37CC55}" srcOrd="0" destOrd="4" presId="urn:microsoft.com/office/officeart/2005/8/layout/chevron1"/>
-    <dgm:cxn modelId="{57BD748D-8441-4978-843F-AA750CB22CEF}" type="presOf" srcId="{8A7F15CD-CC47-48FD-BEBB-8E2D11911FDC}" destId="{B0F6D67C-D3C7-46BE-A9C8-F0A63B37CC55}" srcOrd="0" destOrd="1" presId="urn:microsoft.com/office/officeart/2005/8/layout/chevron1"/>
+    <dgm:cxn modelId="{16AB5179-4860-9C47-997F-17D5B8C08FDE}" type="presOf" srcId="{81415F0E-C1C2-4430-B6A7-F2FFAC97A734}" destId="{9E94C703-8723-6A43-B4FE-04EF0E78C76E}" srcOrd="0" destOrd="0" presId="urn:microsoft.com/office/officeart/2005/8/layout/process2"/>
     <dgm:cxn modelId="{DB147290-445E-42BB-A81C-9A37299F5B47}" srcId="{81415F0E-C1C2-4430-B6A7-F2FFAC97A734}" destId="{358238D7-E74F-4423-A94B-B71561329738}" srcOrd="0" destOrd="0" parTransId="{6A0EAA4A-52A0-44FB-9546-84CD2E880CDF}" sibTransId="{86B24066-FA7B-44F6-9E1C-A634C0C9EF7C}"/>
-    <dgm:cxn modelId="{B8CCE095-AE44-4FB8-A06E-289AB5308C51}" type="presOf" srcId="{1C00C57B-09A8-48C7-B8A9-DE36F8114CA6}" destId="{B0F6D67C-D3C7-46BE-A9C8-F0A63B37CC55}" srcOrd="0" destOrd="2" presId="urn:microsoft.com/office/officeart/2005/8/layout/chevron1"/>
-    <dgm:cxn modelId="{994821A4-0DF9-42B0-96D4-BB75E3D6DE12}" type="presOf" srcId="{BA0E5C66-AD95-4EC1-BB57-CA5D431D8EAA}" destId="{B0F6D67C-D3C7-46BE-A9C8-F0A63B37CC55}" srcOrd="0" destOrd="0" presId="urn:microsoft.com/office/officeart/2005/8/layout/chevron1"/>
-    <dgm:cxn modelId="{43B2DFB0-2346-4FD8-A96F-BAE4D5415506}" srcId="{451F3664-1887-4073-8260-9FC7F369F14A}" destId="{D06C8E07-8815-4701-B198-F439D609E3C3}" srcOrd="4" destOrd="0" parTransId="{FEDE4E08-1D68-4E9E-B5C2-86D9200E114C}" sibTransId="{D4EBCC1F-783E-404F-B194-608BCDCE072E}"/>
-    <dgm:cxn modelId="{D57D1AB7-E435-4951-8BD5-C61C60B9C81C}" srcId="{358238D7-E74F-4423-A94B-B71561329738}" destId="{E77E0608-80C9-4293-8CD2-6B04DE83409C}" srcOrd="0" destOrd="0" parTransId="{CB692754-ED6C-41A1-8625-ECA7B0CDB238}" sibTransId="{2162E976-B723-4CE0-A88A-EB2FBD3DB60E}"/>
-    <dgm:cxn modelId="{A4E814D0-8862-4299-98CF-68FFCBA2E5A0}" srcId="{451F3664-1887-4073-8260-9FC7F369F14A}" destId="{1C00C57B-09A8-48C7-B8A9-DE36F8114CA6}" srcOrd="2" destOrd="0" parTransId="{90B4DAE8-6266-42BE-9DA7-077CD5BBBF48}" sibTransId="{B9D406AC-27CE-462C-92C6-55B750958BFB}"/>
-    <dgm:cxn modelId="{6DEE07D7-629B-44E6-A853-E6B13AAF81E7}" srcId="{451F3664-1887-4073-8260-9FC7F369F14A}" destId="{BA0E5C66-AD95-4EC1-BB57-CA5D431D8EAA}" srcOrd="0" destOrd="0" parTransId="{B92605C3-A23A-4F34-85AC-7BF68405C28E}" sibTransId="{15BAEAF5-FD6B-4205-808F-F6655484FC4A}"/>
+    <dgm:cxn modelId="{F7C0799C-ED36-E748-ACA4-E980FAD2F659}" type="presOf" srcId="{A8717F28-0542-4C60-9012-FED06B218414}" destId="{E4CCA192-D324-544C-B0EA-AB7BB4785F98}" srcOrd="1" destOrd="0" presId="urn:microsoft.com/office/officeart/2005/8/layout/process2"/>
+    <dgm:cxn modelId="{7EF23CD4-A872-9C4D-81ED-86DB192A722D}" type="presOf" srcId="{4415FC87-F301-4E23-B07B-6D9238A4755B}" destId="{4331F363-51FD-3A41-8B71-DF8ADF4A8B9F}" srcOrd="0" destOrd="0" presId="urn:microsoft.com/office/officeart/2005/8/layout/process2"/>
+    <dgm:cxn modelId="{121404D5-165B-4A48-B04A-2F52DB6024CD}" type="presOf" srcId="{86B24066-FA7B-44F6-9E1C-A634C0C9EF7C}" destId="{0DE0BEA9-A054-0644-8D2F-F76457BEE503}" srcOrd="1" destOrd="0" presId="urn:microsoft.com/office/officeart/2005/8/layout/process2"/>
     <dgm:cxn modelId="{FE93F6E8-D5C0-405C-9857-1EE2DDA14A1A}" srcId="{81415F0E-C1C2-4430-B6A7-F2FFAC97A734}" destId="{4415FC87-F301-4E23-B07B-6D9238A4755B}" srcOrd="3" destOrd="0" parTransId="{02895D9A-73F2-4CDF-AF62-1EC35928384C}" sibTransId="{DB0527C1-E358-441F-94EA-BF504AECBD36}"/>
-    <dgm:cxn modelId="{8EEEF7FE-1089-426A-85A6-9DE9DAF8EFC0}" type="presOf" srcId="{8D0365F7-453A-4002-9948-18E5EB6DC029}" destId="{320F41EA-40D2-44B1-A8BB-F1810F26A736}" srcOrd="0" destOrd="0" presId="urn:microsoft.com/office/officeart/2005/8/layout/chevron1"/>
-    <dgm:cxn modelId="{BFAF5C13-8718-4CB9-9A22-6F38EE35C878}" type="presParOf" srcId="{A0F5CC64-861A-46AA-B269-382CDFDC589A}" destId="{17D54155-BDE3-4898-8012-740F6D9240EB}" srcOrd="0" destOrd="0" presId="urn:microsoft.com/office/officeart/2005/8/layout/chevron1"/>
-    <dgm:cxn modelId="{24D19987-12CE-48C7-BEDA-383E0CB99862}" type="presParOf" srcId="{17D54155-BDE3-4898-8012-740F6D9240EB}" destId="{2E353FD0-8725-4E46-81FD-785B1452EF3C}" srcOrd="0" destOrd="0" presId="urn:microsoft.com/office/officeart/2005/8/layout/chevron1"/>
-    <dgm:cxn modelId="{15E800B3-8A1E-47BF-9AF7-20F6956235FB}" type="presParOf" srcId="{17D54155-BDE3-4898-8012-740F6D9240EB}" destId="{44775C42-43C7-4EF0-8CD8-7C9BB12B60B9}" srcOrd="1" destOrd="0" presId="urn:microsoft.com/office/officeart/2005/8/layout/chevron1"/>
-    <dgm:cxn modelId="{36903104-C938-49F3-ADC5-47BBFA12BB24}" type="presParOf" srcId="{A0F5CC64-861A-46AA-B269-382CDFDC589A}" destId="{E4A43304-2424-43C0-AB3D-12F28BFD7CF0}" srcOrd="1" destOrd="0" presId="urn:microsoft.com/office/officeart/2005/8/layout/chevron1"/>
-    <dgm:cxn modelId="{C3693FCC-34A6-4134-B7C5-C18C230BAE15}" type="presParOf" srcId="{A0F5CC64-861A-46AA-B269-382CDFDC589A}" destId="{81B13589-9795-4CED-BC66-ADD8B83AA9AB}" srcOrd="2" destOrd="0" presId="urn:microsoft.com/office/officeart/2005/8/layout/chevron1"/>
-    <dgm:cxn modelId="{A03D3AE1-E85F-46A3-8B70-24AE433703CA}" type="presParOf" srcId="{81B13589-9795-4CED-BC66-ADD8B83AA9AB}" destId="{6AD8E2FC-2F34-4626-B833-B4159B4A12FD}" srcOrd="0" destOrd="0" presId="urn:microsoft.com/office/officeart/2005/8/layout/chevron1"/>
-    <dgm:cxn modelId="{41A877EC-CEF6-4B8C-A98D-805D9632CFE2}" type="presParOf" srcId="{81B13589-9795-4CED-BC66-ADD8B83AA9AB}" destId="{320F41EA-40D2-44B1-A8BB-F1810F26A736}" srcOrd="1" destOrd="0" presId="urn:microsoft.com/office/officeart/2005/8/layout/chevron1"/>
-    <dgm:cxn modelId="{A15E6765-20B2-401C-953C-61E8E82B449C}" type="presParOf" srcId="{A0F5CC64-861A-46AA-B269-382CDFDC589A}" destId="{9B7B86CF-3B34-4A3A-A9F2-59F4AB2F740D}" srcOrd="3" destOrd="0" presId="urn:microsoft.com/office/officeart/2005/8/layout/chevron1"/>
-    <dgm:cxn modelId="{836B4C2D-56B4-479A-8548-53569A49DB78}" type="presParOf" srcId="{A0F5CC64-861A-46AA-B269-382CDFDC589A}" destId="{5E59267D-5F3C-4861-9258-DE1D30A1AEFE}" srcOrd="4" destOrd="0" presId="urn:microsoft.com/office/officeart/2005/8/layout/chevron1"/>
-    <dgm:cxn modelId="{7360305F-1898-4709-93A3-CA4D859019E8}" type="presParOf" srcId="{5E59267D-5F3C-4861-9258-DE1D30A1AEFE}" destId="{DD430E24-DEDA-4284-936A-5749872894DD}" srcOrd="0" destOrd="0" presId="urn:microsoft.com/office/officeart/2005/8/layout/chevron1"/>
-    <dgm:cxn modelId="{25C84BBE-E307-42A6-8A39-6EE5CA34BE86}" type="presParOf" srcId="{5E59267D-5F3C-4861-9258-DE1D30A1AEFE}" destId="{B0F6D67C-D3C7-46BE-A9C8-F0A63B37CC55}" srcOrd="1" destOrd="0" presId="urn:microsoft.com/office/officeart/2005/8/layout/chevron1"/>
-    <dgm:cxn modelId="{C760518C-7F57-4D06-84EE-33723FDB1398}" type="presParOf" srcId="{A0F5CC64-861A-46AA-B269-382CDFDC589A}" destId="{01CAE392-3156-4B32-8352-0616DE0E4AFB}" srcOrd="5" destOrd="0" presId="urn:microsoft.com/office/officeart/2005/8/layout/chevron1"/>
-    <dgm:cxn modelId="{9070C8FB-60DF-48CF-87F6-4D6FABCB72E9}" type="presParOf" srcId="{A0F5CC64-861A-46AA-B269-382CDFDC589A}" destId="{225B8223-0F78-4FE0-88CC-757FAC0F824B}" srcOrd="6" destOrd="0" presId="urn:microsoft.com/office/officeart/2005/8/layout/chevron1"/>
-    <dgm:cxn modelId="{EB0F9F8C-2DFB-46FB-BCB5-F85A3E62C4CD}" type="presParOf" srcId="{225B8223-0F78-4FE0-88CC-757FAC0F824B}" destId="{63E9F576-8E68-4A72-948C-B213FB07D931}" srcOrd="0" destOrd="0" presId="urn:microsoft.com/office/officeart/2005/8/layout/chevron1"/>
-    <dgm:cxn modelId="{ACC97B1F-DCFB-42A2-B904-85E105430006}" type="presParOf" srcId="{225B8223-0F78-4FE0-88CC-757FAC0F824B}" destId="{A9303683-6229-4CDE-A155-6951C3081FF6}" srcOrd="1" destOrd="0" presId="urn:microsoft.com/office/officeart/2005/8/layout/chevron1"/>
+    <dgm:cxn modelId="{113384F7-67DF-C94B-9244-CF8B13246477}" type="presOf" srcId="{A8717F28-0542-4C60-9012-FED06B218414}" destId="{0DABD85C-2D8D-7F4D-A11A-D342C13706A4}" srcOrd="0" destOrd="0" presId="urn:microsoft.com/office/officeart/2005/8/layout/process2"/>
+    <dgm:cxn modelId="{31DE78FB-3E2B-3346-B9FE-80EEDCFD3604}" type="presOf" srcId="{451F3664-1887-4073-8260-9FC7F369F14A}" destId="{17DBAB15-4315-D944-88A4-D49FE0A0DF65}" srcOrd="0" destOrd="0" presId="urn:microsoft.com/office/officeart/2005/8/layout/process2"/>
+    <dgm:cxn modelId="{E24E5503-A062-3A4D-9FC4-DEE3938CE32B}" type="presParOf" srcId="{9E94C703-8723-6A43-B4FE-04EF0E78C76E}" destId="{36D7FCA5-5093-774F-9025-60569732EB45}" srcOrd="0" destOrd="0" presId="urn:microsoft.com/office/officeart/2005/8/layout/process2"/>
+    <dgm:cxn modelId="{AFFE6298-6A02-BB41-AE86-1B49000E79F6}" type="presParOf" srcId="{9E94C703-8723-6A43-B4FE-04EF0E78C76E}" destId="{998B3E43-74E7-FA47-B216-32E43307E41A}" srcOrd="1" destOrd="0" presId="urn:microsoft.com/office/officeart/2005/8/layout/process2"/>
+    <dgm:cxn modelId="{602E4EC0-4C53-1B4D-A0CE-A85EE60F3D93}" type="presParOf" srcId="{998B3E43-74E7-FA47-B216-32E43307E41A}" destId="{0DE0BEA9-A054-0644-8D2F-F76457BEE503}" srcOrd="0" destOrd="0" presId="urn:microsoft.com/office/officeart/2005/8/layout/process2"/>
+    <dgm:cxn modelId="{C6FCBF9C-417F-434F-B412-5571E4E599D2}" type="presParOf" srcId="{9E94C703-8723-6A43-B4FE-04EF0E78C76E}" destId="{42546C1D-91CB-704F-BB46-EA6F4F49ABDE}" srcOrd="2" destOrd="0" presId="urn:microsoft.com/office/officeart/2005/8/layout/process2"/>
+    <dgm:cxn modelId="{E0AADC66-46F7-D345-8564-83004F7236B2}" type="presParOf" srcId="{9E94C703-8723-6A43-B4FE-04EF0E78C76E}" destId="{4C4E68B0-E783-2E46-83EC-65154D1F809A}" srcOrd="3" destOrd="0" presId="urn:microsoft.com/office/officeart/2005/8/layout/process2"/>
+    <dgm:cxn modelId="{B1D4E3A7-6E14-5646-8169-D9BEE1B29FC1}" type="presParOf" srcId="{4C4E68B0-E783-2E46-83EC-65154D1F809A}" destId="{30C0D766-2E2D-2D44-8131-3D3E28D05CDE}" srcOrd="0" destOrd="0" presId="urn:microsoft.com/office/officeart/2005/8/layout/process2"/>
+    <dgm:cxn modelId="{C408F850-03EA-824B-858A-84B38233C38B}" type="presParOf" srcId="{9E94C703-8723-6A43-B4FE-04EF0E78C76E}" destId="{17DBAB15-4315-D944-88A4-D49FE0A0DF65}" srcOrd="4" destOrd="0" presId="urn:microsoft.com/office/officeart/2005/8/layout/process2"/>
+    <dgm:cxn modelId="{E31DE934-1F85-0143-9B58-2C506D94B8BF}" type="presParOf" srcId="{9E94C703-8723-6A43-B4FE-04EF0E78C76E}" destId="{0DABD85C-2D8D-7F4D-A11A-D342C13706A4}" srcOrd="5" destOrd="0" presId="urn:microsoft.com/office/officeart/2005/8/layout/process2"/>
+    <dgm:cxn modelId="{CEBDED47-4C9C-4241-8BC9-898F0859BC01}" type="presParOf" srcId="{0DABD85C-2D8D-7F4D-A11A-D342C13706A4}" destId="{E4CCA192-D324-544C-B0EA-AB7BB4785F98}" srcOrd="0" destOrd="0" presId="urn:microsoft.com/office/officeart/2005/8/layout/process2"/>
+    <dgm:cxn modelId="{95C042AD-C45A-C644-85B6-E81B7A84404A}" type="presParOf" srcId="{9E94C703-8723-6A43-B4FE-04EF0E78C76E}" destId="{4331F363-51FD-3A41-8B71-DF8ADF4A8B9F}" srcOrd="6" destOrd="0" presId="urn:microsoft.com/office/officeart/2005/8/layout/process2"/>
   </dgm:cxnLst>
   <dgm:bg/>
   <dgm:whole/>
@@ -1665,26 +1453,23 @@
       <dsp:cNvGrpSpPr/>
     </dsp:nvGrpSpPr>
     <dsp:grpSpPr/>
-    <dsp:sp modelId="{2E353FD0-8725-4E46-81FD-785B1452EF3C}">
+    <dsp:sp modelId="{36D7FCA5-5093-774F-9025-60569732EB45}">
       <dsp:nvSpPr>
         <dsp:cNvPr id="0" name=""/>
         <dsp:cNvSpPr/>
       </dsp:nvSpPr>
       <dsp:spPr>
         <a:xfrm>
-          <a:off x="7000" y="251784"/>
-          <a:ext cx="1961877" cy="784750"/>
+          <a:off x="1208186" y="2435"/>
+          <a:ext cx="1892856" cy="906032"/>
         </a:xfrm>
-        <a:prstGeom prst="chevron">
-          <a:avLst/>
+        <a:prstGeom prst="roundRect">
+          <a:avLst>
+            <a:gd name="adj" fmla="val 10000"/>
+          </a:avLst>
         </a:prstGeom>
         <a:solidFill>
-          <a:schemeClr val="lt1">
-            <a:hueOff val="0"/>
-            <a:satOff val="0"/>
-            <a:lumOff val="0"/>
-            <a:alphaOff val="0"/>
-          </a:schemeClr>
+          <a:srgbClr val="CCC6E2"/>
         </a:solidFill>
         <a:ln w="12700" cap="flat" cmpd="sng" algn="ctr">
           <a:solidFill>
@@ -1716,38 +1501,12 @@
         </a:fontRef>
       </dsp:style>
       <dsp:txBody>
-        <a:bodyPr spcFirstLastPara="0" vert="horz" wrap="square" lIns="60008" tIns="20003" rIns="20003" bIns="20003" numCol="1" spcCol="1270" anchor="ctr" anchorCtr="0">
+        <a:bodyPr spcFirstLastPara="0" vert="horz" wrap="square" lIns="53340" tIns="53340" rIns="53340" bIns="53340" numCol="1" spcCol="1270" anchor="ctr" anchorCtr="0">
           <a:noAutofit/>
         </a:bodyPr>
         <a:lstStyle/>
         <a:p>
-          <a:pPr marL="0" lvl="0" indent="0" algn="ctr" defTabSz="666750">
-            <a:lnSpc>
-              <a:spcPct val="100000"/>
-            </a:lnSpc>
-            <a:spcBef>
-              <a:spcPct val="0"/>
-            </a:spcBef>
-            <a:spcAft>
-              <a:spcPct val="35000"/>
-            </a:spcAft>
-            <a:buNone/>
-          </a:pPr>
-          <a:r>
-            <a:rPr lang="en-US" sz="1500" b="1" kern="1200" dirty="0">
-              <a:latin typeface="Bodoni MT" panose="02070603080606020203" pitchFamily="18" charset="0"/>
-            </a:rPr>
-            <a:t>2568</a:t>
-          </a:r>
-          <a:r>
-            <a:rPr lang="en-US" sz="1000" kern="1200" dirty="0">
-              <a:latin typeface="Bodoni MT" panose="02070603080606020203" pitchFamily="18" charset="0"/>
-            </a:rPr>
-            <a:t> </a:t>
-          </a:r>
-        </a:p>
-        <a:p>
-          <a:pPr marL="0" lvl="0" indent="0" algn="ctr" defTabSz="666750">
+          <a:pPr marL="0" lvl="0" indent="0" algn="ctr" defTabSz="622300">
             <a:lnSpc>
               <a:spcPct val="90000"/>
             </a:lnSpc>
@@ -1760,32 +1519,63 @@
             <a:buNone/>
           </a:pPr>
           <a:r>
-            <a:rPr lang="en-US" sz="1000" kern="1200" dirty="0">
+            <a:rPr lang="en-US" sz="1400" b="0" kern="1200" dirty="0">
               <a:latin typeface="Bodoni MT" panose="02070603080606020203" pitchFamily="18" charset="0"/>
             </a:rPr>
-            <a:t>references imported</a:t>
+            <a:t>Records identified from Databases </a:t>
+          </a:r>
+        </a:p>
+        <a:p>
+          <a:pPr marL="0" lvl="0" indent="0" algn="ctr" defTabSz="622300">
+            <a:lnSpc>
+              <a:spcPct val="90000"/>
+            </a:lnSpc>
+            <a:spcBef>
+              <a:spcPct val="0"/>
+            </a:spcBef>
+            <a:spcAft>
+              <a:spcPct val="35000"/>
+            </a:spcAft>
+            <a:buNone/>
+          </a:pPr>
+          <a:r>
+            <a:rPr lang="en-US" sz="1400" b="0" kern="1200" dirty="0">
+              <a:latin typeface="Bodoni MT" panose="02070603080606020203" pitchFamily="18" charset="0"/>
+            </a:rPr>
+            <a:t>(n = 2568)</a:t>
           </a:r>
         </a:p>
       </dsp:txBody>
       <dsp:txXfrm>
-        <a:off x="399375" y="251784"/>
-        <a:ext cx="1177127" cy="784750"/>
+        <a:off x="1234723" y="28972"/>
+        <a:ext cx="1839782" cy="852958"/>
       </dsp:txXfrm>
     </dsp:sp>
-    <dsp:sp modelId="{44775C42-43C7-4EF0-8CD8-7C9BB12B60B9}">
+    <dsp:sp modelId="{998B3E43-74E7-FA47-B216-32E43307E41A}">
       <dsp:nvSpPr>
         <dsp:cNvPr id="0" name=""/>
         <dsp:cNvSpPr/>
       </dsp:nvSpPr>
       <dsp:spPr>
-        <a:xfrm>
-          <a:off x="7000" y="1134629"/>
-          <a:ext cx="1569501" cy="1206562"/>
+        <a:xfrm rot="5400000">
+          <a:off x="1984733" y="931119"/>
+          <a:ext cx="339762" cy="407714"/>
         </a:xfrm>
-        <a:prstGeom prst="rect">
-          <a:avLst/>
+        <a:prstGeom prst="rightArrow">
+          <a:avLst>
+            <a:gd name="adj1" fmla="val 60000"/>
+            <a:gd name="adj2" fmla="val 50000"/>
+          </a:avLst>
         </a:prstGeom>
-        <a:noFill/>
+        <a:solidFill>
+          <a:schemeClr val="dk1">
+            <a:tint val="60000"/>
+            <a:hueOff val="0"/>
+            <a:satOff val="0"/>
+            <a:lumOff val="0"/>
+            <a:alphaOff val="0"/>
+          </a:schemeClr>
+        </a:solidFill>
         <a:ln>
           <a:noFill/>
         </a:ln>
@@ -1795,21 +1585,23 @@
         <a:lnRef idx="0">
           <a:scrgbClr r="0" g="0" b="0"/>
         </a:lnRef>
-        <a:fillRef idx="0">
+        <a:fillRef idx="1">
           <a:scrgbClr r="0" g="0" b="0"/>
         </a:fillRef>
         <a:effectRef idx="0">
           <a:scrgbClr r="0" g="0" b="0"/>
         </a:effectRef>
-        <a:fontRef idx="minor"/>
+        <a:fontRef idx="minor">
+          <a:schemeClr val="lt1"/>
+        </a:fontRef>
       </dsp:style>
       <dsp:txBody>
-        <a:bodyPr spcFirstLastPara="0" vert="horz" wrap="square" lIns="0" tIns="0" rIns="0" bIns="0" numCol="1" spcCol="1270" anchor="t" anchorCtr="0">
+        <a:bodyPr spcFirstLastPara="0" vert="horz" wrap="square" lIns="0" tIns="0" rIns="0" bIns="0" numCol="1" spcCol="1270" anchor="ctr" anchorCtr="0">
           <a:noAutofit/>
         </a:bodyPr>
         <a:lstStyle/>
         <a:p>
-          <a:pPr marL="57150" lvl="1" indent="-57150" algn="l" defTabSz="444500">
+          <a:pPr marL="0" lvl="0" indent="0" algn="ctr" defTabSz="622300" rtl="0">
             <a:lnSpc>
               <a:spcPct val="90000"/>
             </a:lnSpc>
@@ -1817,59 +1609,47 @@
               <a:spcPct val="0"/>
             </a:spcBef>
             <a:spcAft>
-              <a:spcPct val="15000"/>
+              <a:spcPct val="35000"/>
             </a:spcAft>
-            <a:buChar char="•"/>
+            <a:buNone/>
           </a:pPr>
-          <a:r>
-            <a:rPr lang="en-US" sz="1000" b="1" kern="1200" dirty="0">
-              <a:latin typeface="Bodoni MT" panose="02070603080606020203" pitchFamily="18" charset="0"/>
-            </a:rPr>
-            <a:t>4</a:t>
-          </a:r>
-          <a:r>
-            <a:rPr lang="en-US" sz="1000" kern="1200" dirty="0">
-              <a:latin typeface="Bodoni MT" panose="02070603080606020203" pitchFamily="18" charset="0"/>
-            </a:rPr>
-            <a:t> duplicates removed</a:t>
-          </a:r>
+          <a:endParaRPr lang="en-US" sz="1400" b="0" kern="1200">
+            <a:latin typeface="Bodoni MT" panose="02070603080606020203" pitchFamily="18" charset="0"/>
+          </a:endParaRPr>
         </a:p>
       </dsp:txBody>
-      <dsp:txXfrm>
-        <a:off x="7000" y="1134629"/>
-        <a:ext cx="1569501" cy="1206562"/>
+      <dsp:txXfrm rot="-5400000">
+        <a:off x="2032301" y="965095"/>
+        <a:ext cx="244628" cy="237833"/>
       </dsp:txXfrm>
     </dsp:sp>
-    <dsp:sp modelId="{6AD8E2FC-2F34-4626-B833-B4159B4A12FD}">
+    <dsp:sp modelId="{42546C1D-91CB-704F-BB46-EA6F4F49ABDE}">
       <dsp:nvSpPr>
         <dsp:cNvPr id="0" name=""/>
         <dsp:cNvSpPr/>
       </dsp:nvSpPr>
       <dsp:spPr>
         <a:xfrm>
-          <a:off x="1752877" y="251784"/>
-          <a:ext cx="1961877" cy="784750"/>
+          <a:off x="1223834" y="1361484"/>
+          <a:ext cx="1861560" cy="906032"/>
         </a:xfrm>
-        <a:prstGeom prst="chevron">
-          <a:avLst/>
+        <a:prstGeom prst="roundRect">
+          <a:avLst>
+            <a:gd name="adj" fmla="val 10000"/>
+          </a:avLst>
         </a:prstGeom>
         <a:solidFill>
-          <a:schemeClr val="lt1">
-            <a:hueOff val="0"/>
-            <a:satOff val="0"/>
-            <a:lumOff val="0"/>
-            <a:alphaOff val="0"/>
-          </a:schemeClr>
+          <a:srgbClr val="CCC6E2"/>
         </a:solidFill>
         <a:ln w="12700" cap="flat" cmpd="sng" algn="ctr">
           <a:solidFill>
-            <a:schemeClr val="dk1">
+            <a:prstClr val="black">
               <a:shade val="80000"/>
               <a:hueOff val="0"/>
               <a:satOff val="0"/>
               <a:lumOff val="0"/>
               <a:alphaOff val="0"/>
-            </a:schemeClr>
+            </a:prstClr>
           </a:solidFill>
           <a:prstDash val="solid"/>
           <a:miter lim="800000"/>
@@ -1891,12 +1671,12 @@
         </a:fontRef>
       </dsp:style>
       <dsp:txBody>
-        <a:bodyPr spcFirstLastPara="0" vert="horz" wrap="square" lIns="60008" tIns="20003" rIns="20003" bIns="20003" numCol="1" spcCol="1270" anchor="ctr" anchorCtr="0">
+        <a:bodyPr spcFirstLastPara="0" vert="horz" wrap="square" lIns="38100" tIns="38100" rIns="38100" bIns="38100" numCol="1" spcCol="1270" anchor="ctr" anchorCtr="0">
           <a:noAutofit/>
         </a:bodyPr>
         <a:lstStyle/>
         <a:p>
-          <a:pPr marL="0" lvl="0" indent="0" algn="ctr" defTabSz="666750">
+          <a:pPr marL="0" lvl="0" indent="0" algn="ctr" defTabSz="444500">
             <a:lnSpc>
               <a:spcPct val="90000"/>
             </a:lnSpc>
@@ -1909,20 +1689,24 @@
             <a:buNone/>
           </a:pPr>
           <a:r>
-            <a:rPr lang="en-US" sz="1500" b="1" kern="1200" dirty="0">
+            <a:rPr lang="en-US" sz="1400" b="0" kern="1200" dirty="0">
+              <a:solidFill>
+                <a:prstClr val="black">
+                  <a:hueOff val="0"/>
+                  <a:satOff val="0"/>
+                  <a:lumOff val="0"/>
+                  <a:alphaOff val="0"/>
+                </a:prstClr>
+              </a:solidFill>
               <a:latin typeface="Bodoni MT" panose="02070603080606020203" pitchFamily="18" charset="0"/>
+              <a:ea typeface="+mn-ea"/>
+              <a:cs typeface="+mn-cs"/>
             </a:rPr>
-            <a:t>2564</a:t>
-          </a:r>
-          <a:r>
-            <a:rPr lang="en-US" sz="1000" kern="1200" dirty="0">
-              <a:latin typeface="Bodoni MT" panose="02070603080606020203" pitchFamily="18" charset="0"/>
-            </a:rPr>
-            <a:t> </a:t>
+            <a:t>Record screened </a:t>
           </a:r>
         </a:p>
         <a:p>
-          <a:pPr marL="0" lvl="0" indent="0" algn="ctr" defTabSz="666750">
+          <a:pPr marL="0" lvl="0" indent="0" algn="ctr" defTabSz="444500">
             <a:lnSpc>
               <a:spcPct val="90000"/>
             </a:lnSpc>
@@ -1935,32 +1719,53 @@
             <a:buNone/>
           </a:pPr>
           <a:r>
-            <a:rPr lang="en-US" sz="1000" kern="1200" dirty="0">
+            <a:rPr lang="en-US" sz="1400" b="0" kern="1200" dirty="0">
+              <a:solidFill>
+                <a:prstClr val="black">
+                  <a:hueOff val="0"/>
+                  <a:satOff val="0"/>
+                  <a:lumOff val="0"/>
+                  <a:alphaOff val="0"/>
+                </a:prstClr>
+              </a:solidFill>
               <a:latin typeface="Bodoni MT" panose="02070603080606020203" pitchFamily="18" charset="0"/>
+              <a:ea typeface="+mn-ea"/>
+              <a:cs typeface="+mn-cs"/>
             </a:rPr>
-            <a:t>studies screened against title and abstract</a:t>
+            <a:t>(n=2564 )</a:t>
           </a:r>
         </a:p>
       </dsp:txBody>
       <dsp:txXfrm>
-        <a:off x="2145252" y="251784"/>
-        <a:ext cx="1177127" cy="784750"/>
+        <a:off x="1250371" y="1388021"/>
+        <a:ext cx="1808486" cy="852958"/>
       </dsp:txXfrm>
     </dsp:sp>
-    <dsp:sp modelId="{320F41EA-40D2-44B1-A8BB-F1810F26A736}">
+    <dsp:sp modelId="{4C4E68B0-E783-2E46-83EC-65154D1F809A}">
       <dsp:nvSpPr>
         <dsp:cNvPr id="0" name=""/>
         <dsp:cNvSpPr/>
       </dsp:nvSpPr>
       <dsp:spPr>
-        <a:xfrm>
-          <a:off x="1752877" y="1134629"/>
-          <a:ext cx="1569501" cy="1206562"/>
+        <a:xfrm rot="5400000">
+          <a:off x="1984733" y="2290168"/>
+          <a:ext cx="339762" cy="407714"/>
         </a:xfrm>
-        <a:prstGeom prst="rect">
-          <a:avLst/>
+        <a:prstGeom prst="rightArrow">
+          <a:avLst>
+            <a:gd name="adj1" fmla="val 60000"/>
+            <a:gd name="adj2" fmla="val 50000"/>
+          </a:avLst>
         </a:prstGeom>
-        <a:noFill/>
+        <a:solidFill>
+          <a:schemeClr val="dk1">
+            <a:tint val="60000"/>
+            <a:hueOff val="0"/>
+            <a:satOff val="0"/>
+            <a:lumOff val="0"/>
+            <a:alphaOff val="0"/>
+          </a:schemeClr>
+        </a:solidFill>
         <a:ln>
           <a:noFill/>
         </a:ln>
@@ -1970,21 +1775,23 @@
         <a:lnRef idx="0">
           <a:scrgbClr r="0" g="0" b="0"/>
         </a:lnRef>
-        <a:fillRef idx="0">
+        <a:fillRef idx="1">
           <a:scrgbClr r="0" g="0" b="0"/>
         </a:fillRef>
         <a:effectRef idx="0">
           <a:scrgbClr r="0" g="0" b="0"/>
         </a:effectRef>
-        <a:fontRef idx="minor"/>
+        <a:fontRef idx="minor">
+          <a:schemeClr val="lt1"/>
+        </a:fontRef>
       </dsp:style>
       <dsp:txBody>
-        <a:bodyPr spcFirstLastPara="0" vert="horz" wrap="square" lIns="0" tIns="0" rIns="0" bIns="0" numCol="1" spcCol="1270" anchor="t" anchorCtr="0">
+        <a:bodyPr spcFirstLastPara="0" vert="horz" wrap="square" lIns="0" tIns="0" rIns="0" bIns="0" numCol="1" spcCol="1270" anchor="ctr" anchorCtr="0">
           <a:noAutofit/>
         </a:bodyPr>
         <a:lstStyle/>
         <a:p>
-          <a:pPr marL="57150" lvl="1" indent="-57150" algn="l" defTabSz="444500">
+          <a:pPr marL="0" lvl="0" indent="0" algn="ctr" defTabSz="622300" rtl="0">
             <a:lnSpc>
               <a:spcPct val="90000"/>
             </a:lnSpc>
@@ -1992,59 +1799,47 @@
               <a:spcPct val="0"/>
             </a:spcBef>
             <a:spcAft>
-              <a:spcPct val="15000"/>
+              <a:spcPct val="35000"/>
             </a:spcAft>
-            <a:buChar char="•"/>
+            <a:buNone/>
           </a:pPr>
-          <a:r>
-            <a:rPr lang="en-US" sz="1000" b="1" kern="1200" dirty="0">
-              <a:latin typeface="Bodoni MT" panose="02070603080606020203" pitchFamily="18" charset="0"/>
-            </a:rPr>
-            <a:t>1954</a:t>
-          </a:r>
-          <a:r>
-            <a:rPr lang="en-US" sz="1000" kern="1200" dirty="0">
-              <a:latin typeface="Bodoni MT" panose="02070603080606020203" pitchFamily="18" charset="0"/>
-            </a:rPr>
-            <a:t> studies excluded</a:t>
-          </a:r>
+          <a:endParaRPr lang="en-US" sz="1400" b="0" kern="1200">
+            <a:latin typeface="Bodoni MT" panose="02070603080606020203" pitchFamily="18" charset="0"/>
+          </a:endParaRPr>
         </a:p>
       </dsp:txBody>
-      <dsp:txXfrm>
-        <a:off x="1752877" y="1134629"/>
-        <a:ext cx="1569501" cy="1206562"/>
+      <dsp:txXfrm rot="-5400000">
+        <a:off x="2032301" y="2324144"/>
+        <a:ext cx="244628" cy="237833"/>
       </dsp:txXfrm>
     </dsp:sp>
-    <dsp:sp modelId="{DD430E24-DEDA-4284-936A-5749872894DD}">
+    <dsp:sp modelId="{17DBAB15-4315-D944-88A4-D49FE0A0DF65}">
       <dsp:nvSpPr>
         <dsp:cNvPr id="0" name=""/>
         <dsp:cNvSpPr/>
       </dsp:nvSpPr>
       <dsp:spPr>
         <a:xfrm>
-          <a:off x="3498754" y="251784"/>
-          <a:ext cx="1961877" cy="784750"/>
+          <a:off x="1231654" y="2720534"/>
+          <a:ext cx="1845920" cy="906032"/>
         </a:xfrm>
-        <a:prstGeom prst="chevron">
-          <a:avLst/>
+        <a:prstGeom prst="roundRect">
+          <a:avLst>
+            <a:gd name="adj" fmla="val 10000"/>
+          </a:avLst>
         </a:prstGeom>
         <a:solidFill>
-          <a:schemeClr val="lt1">
-            <a:hueOff val="0"/>
-            <a:satOff val="0"/>
-            <a:lumOff val="0"/>
-            <a:alphaOff val="0"/>
-          </a:schemeClr>
+          <a:srgbClr val="CCC6E2"/>
         </a:solidFill>
         <a:ln w="12700" cap="flat" cmpd="sng" algn="ctr">
           <a:solidFill>
-            <a:schemeClr val="dk1">
+            <a:prstClr val="black">
               <a:shade val="80000"/>
               <a:hueOff val="0"/>
               <a:satOff val="0"/>
               <a:lumOff val="0"/>
               <a:alphaOff val="0"/>
-            </a:schemeClr>
+            </a:prstClr>
           </a:solidFill>
           <a:prstDash val="solid"/>
           <a:miter lim="800000"/>
@@ -2066,12 +1861,12 @@
         </a:fontRef>
       </dsp:style>
       <dsp:txBody>
-        <a:bodyPr spcFirstLastPara="0" vert="horz" wrap="square" lIns="60008" tIns="20003" rIns="20003" bIns="20003" numCol="1" spcCol="1270" anchor="ctr" anchorCtr="0">
+        <a:bodyPr spcFirstLastPara="0" vert="horz" wrap="square" lIns="38100" tIns="38100" rIns="38100" bIns="38100" numCol="1" spcCol="1270" anchor="ctr" anchorCtr="0">
           <a:noAutofit/>
         </a:bodyPr>
         <a:lstStyle/>
         <a:p>
-          <a:pPr marL="0" lvl="0" indent="0" algn="ctr" defTabSz="666750">
+          <a:pPr marL="0" lvl="0" indent="0" algn="ctr" defTabSz="622300">
             <a:lnSpc>
               <a:spcPct val="90000"/>
             </a:lnSpc>
@@ -2084,20 +1879,36 @@
             <a:buNone/>
           </a:pPr>
           <a:r>
-            <a:rPr lang="en-US" sz="1500" b="1" kern="1200" dirty="0">
+            <a:rPr lang="en-US" sz="1400" b="0" kern="1200" dirty="0">
               <a:latin typeface="Bodoni MT" panose="02070603080606020203" pitchFamily="18" charset="0"/>
             </a:rPr>
-            <a:t>610</a:t>
+            <a:t>Reports assessed for </a:t>
           </a:r>
           <a:r>
-            <a:rPr lang="en-US" sz="1000" kern="1200" dirty="0">
+            <a:rPr lang="en-US" sz="1400" b="0" kern="1200" dirty="0">
+              <a:solidFill>
+                <a:prstClr val="black">
+                  <a:hueOff val="0"/>
+                  <a:satOff val="0"/>
+                  <a:lumOff val="0"/>
+                  <a:alphaOff val="0"/>
+                </a:prstClr>
+              </a:solidFill>
+              <a:latin typeface="Bodoni MT" panose="02070603080606020203" pitchFamily="18" charset="0"/>
+              <a:ea typeface="+mn-ea"/>
+              <a:cs typeface="+mn-cs"/>
+            </a:rPr>
+            <a:t>eligibility</a:t>
+          </a:r>
+          <a:r>
+            <a:rPr lang="en-US" sz="1400" b="0" kern="1200" dirty="0">
               <a:latin typeface="Bodoni MT" panose="02070603080606020203" pitchFamily="18" charset="0"/>
             </a:rPr>
-            <a:t> </a:t>
+            <a:t> (n=610)</a:t>
           </a:r>
         </a:p>
         <a:p>
-          <a:pPr marL="0" lvl="0" indent="0" algn="ctr" defTabSz="666750">
+          <a:pPr marL="0" lvl="0" indent="0" algn="ctr" defTabSz="622300">
             <a:lnSpc>
               <a:spcPct val="90000"/>
             </a:lnSpc>
@@ -2110,32 +1921,43 @@
             <a:buNone/>
           </a:pPr>
           <a:r>
-            <a:rPr lang="en-US" sz="1000" kern="1200" dirty="0">
+            <a:rPr lang="en-US" sz="1400" b="0" kern="1200" dirty="0">
               <a:latin typeface="Bodoni MT" panose="02070603080606020203" pitchFamily="18" charset="0"/>
             </a:rPr>
-            <a:t>studies assessed for full-text eligibility</a:t>
+            <a:t> </a:t>
           </a:r>
         </a:p>
       </dsp:txBody>
       <dsp:txXfrm>
-        <a:off x="3891129" y="251784"/>
-        <a:ext cx="1177127" cy="784750"/>
+        <a:off x="1258191" y="2747071"/>
+        <a:ext cx="1792846" cy="852958"/>
       </dsp:txXfrm>
     </dsp:sp>
-    <dsp:sp modelId="{B0F6D67C-D3C7-46BE-A9C8-F0A63B37CC55}">
+    <dsp:sp modelId="{0DABD85C-2D8D-7F4D-A11A-D342C13706A4}">
       <dsp:nvSpPr>
         <dsp:cNvPr id="0" name=""/>
         <dsp:cNvSpPr/>
       </dsp:nvSpPr>
       <dsp:spPr>
-        <a:xfrm>
-          <a:off x="3498754" y="1134629"/>
-          <a:ext cx="1569501" cy="1206562"/>
+        <a:xfrm rot="5400000">
+          <a:off x="1984733" y="3649217"/>
+          <a:ext cx="339762" cy="407714"/>
         </a:xfrm>
-        <a:prstGeom prst="rect">
-          <a:avLst/>
+        <a:prstGeom prst="rightArrow">
+          <a:avLst>
+            <a:gd name="adj1" fmla="val 60000"/>
+            <a:gd name="adj2" fmla="val 50000"/>
+          </a:avLst>
         </a:prstGeom>
-        <a:noFill/>
+        <a:solidFill>
+          <a:schemeClr val="dk1">
+            <a:tint val="60000"/>
+            <a:hueOff val="0"/>
+            <a:satOff val="0"/>
+            <a:lumOff val="0"/>
+            <a:alphaOff val="0"/>
+          </a:schemeClr>
+        </a:solidFill>
         <a:ln>
           <a:noFill/>
         </a:ln>
@@ -2145,21 +1967,23 @@
         <a:lnRef idx="0">
           <a:scrgbClr r="0" g="0" b="0"/>
         </a:lnRef>
-        <a:fillRef idx="0">
+        <a:fillRef idx="1">
           <a:scrgbClr r="0" g="0" b="0"/>
         </a:fillRef>
         <a:effectRef idx="0">
           <a:scrgbClr r="0" g="0" b="0"/>
         </a:effectRef>
-        <a:fontRef idx="minor"/>
+        <a:fontRef idx="minor">
+          <a:schemeClr val="lt1"/>
+        </a:fontRef>
       </dsp:style>
       <dsp:txBody>
-        <a:bodyPr spcFirstLastPara="0" vert="horz" wrap="square" lIns="0" tIns="0" rIns="0" bIns="0" numCol="1" spcCol="1270" anchor="t" anchorCtr="0">
+        <a:bodyPr spcFirstLastPara="0" vert="horz" wrap="square" lIns="0" tIns="0" rIns="0" bIns="0" numCol="1" spcCol="1270" anchor="ctr" anchorCtr="0">
           <a:noAutofit/>
         </a:bodyPr>
         <a:lstStyle/>
         <a:p>
-          <a:pPr marL="57150" lvl="1" indent="-57150" algn="l" defTabSz="444500">
+          <a:pPr marL="0" lvl="0" indent="0" algn="ctr" defTabSz="622300">
             <a:lnSpc>
               <a:spcPct val="90000"/>
             </a:lnSpc>
@@ -2167,160 +1991,47 @@
               <a:spcPct val="0"/>
             </a:spcBef>
             <a:spcAft>
-              <a:spcPct val="15000"/>
+              <a:spcPct val="35000"/>
             </a:spcAft>
             <a:buNone/>
           </a:pPr>
-          <a:r>
-            <a:rPr lang="en-US" sz="1000" b="1" kern="1200" dirty="0">
-              <a:latin typeface="Bodoni MT" panose="02070603080606020203" pitchFamily="18" charset="0"/>
-            </a:rPr>
-            <a:t>160</a:t>
-          </a:r>
-          <a:r>
-            <a:rPr lang="en-US" sz="1000" kern="1200" dirty="0">
-              <a:latin typeface="Bodoni MT" panose="02070603080606020203" pitchFamily="18" charset="0"/>
-            </a:rPr>
-            <a:t> studies excluded, thereof</a:t>
-          </a:r>
-        </a:p>
-        <a:p>
-          <a:pPr marL="57150" lvl="1" indent="-57150" algn="l" defTabSz="444500">
-            <a:lnSpc>
-              <a:spcPct val="90000"/>
-            </a:lnSpc>
-            <a:spcBef>
-              <a:spcPct val="0"/>
-            </a:spcBef>
-            <a:spcAft>
-              <a:spcPct val="15000"/>
-            </a:spcAft>
-            <a:buFont typeface="Arial" panose="020B0604020202020204" pitchFamily="34" charset="0"/>
-            <a:buChar char="•"/>
-          </a:pPr>
-          <a:r>
-            <a:rPr lang="en-US" sz="1000" b="1" kern="1200" dirty="0">
-              <a:latin typeface="Bodoni MT" panose="02070603080606020203" pitchFamily="18" charset="0"/>
-            </a:rPr>
-            <a:t>87</a:t>
-          </a:r>
-          <a:r>
-            <a:rPr lang="en-US" sz="1000" kern="1200" dirty="0">
-              <a:latin typeface="Bodoni MT" panose="02070603080606020203" pitchFamily="18" charset="0"/>
-            </a:rPr>
-            <a:t>  with no concrete medical supervised ML use case, </a:t>
-          </a:r>
-        </a:p>
-        <a:p>
-          <a:pPr marL="57150" lvl="1" indent="-57150" algn="l" defTabSz="444500">
-            <a:lnSpc>
-              <a:spcPct val="90000"/>
-            </a:lnSpc>
-            <a:spcBef>
-              <a:spcPct val="0"/>
-            </a:spcBef>
-            <a:spcAft>
-              <a:spcPct val="15000"/>
-            </a:spcAft>
-            <a:buFont typeface="Arial" panose="020B0604020202020204" pitchFamily="34" charset="0"/>
-            <a:buChar char="•"/>
-          </a:pPr>
-          <a:r>
-            <a:rPr lang="en-US" sz="1000" b="1" kern="1200" dirty="0">
-              <a:latin typeface="Bodoni MT" panose="02070603080606020203" pitchFamily="18" charset="0"/>
-            </a:rPr>
-            <a:t>64</a:t>
-          </a:r>
-          <a:r>
-            <a:rPr lang="en-US" sz="1000" kern="1200" dirty="0">
-              <a:latin typeface="Bodoni MT" panose="02070603080606020203" pitchFamily="18" charset="0"/>
-            </a:rPr>
-            <a:t>  No XAI method provided, </a:t>
-          </a:r>
-        </a:p>
-        <a:p>
-          <a:pPr marL="57150" lvl="1" indent="-57150" algn="l" defTabSz="444500">
-            <a:lnSpc>
-              <a:spcPct val="90000"/>
-            </a:lnSpc>
-            <a:spcBef>
-              <a:spcPct val="0"/>
-            </a:spcBef>
-            <a:spcAft>
-              <a:spcPct val="15000"/>
-            </a:spcAft>
-            <a:buFont typeface="Arial" panose="020B0604020202020204" pitchFamily="34" charset="0"/>
-            <a:buChar char="•"/>
-          </a:pPr>
-          <a:r>
-            <a:rPr lang="en-US" sz="1000" b="1" kern="1200" dirty="0">
-              <a:latin typeface="Bodoni MT" panose="02070603080606020203" pitchFamily="18" charset="0"/>
-            </a:rPr>
-            <a:t>13</a:t>
-          </a:r>
-          <a:r>
-            <a:rPr lang="en-US" sz="1000" kern="1200" dirty="0">
-              <a:latin typeface="Bodoni MT" panose="02070603080606020203" pitchFamily="18" charset="0"/>
-            </a:rPr>
-            <a:t>  No tabular or image data as input</a:t>
-          </a:r>
-        </a:p>
-        <a:p>
-          <a:pPr marL="57150" lvl="1" indent="-57150" algn="l" defTabSz="444500">
-            <a:lnSpc>
-              <a:spcPct val="90000"/>
-            </a:lnSpc>
-            <a:spcBef>
-              <a:spcPct val="0"/>
-            </a:spcBef>
-            <a:spcAft>
-              <a:spcPct val="15000"/>
-            </a:spcAft>
-            <a:buNone/>
-          </a:pPr>
-          <a:r>
-            <a:rPr lang="en-US" sz="1000" kern="1200" dirty="0">
-              <a:latin typeface="Bodoni MT" panose="02070603080606020203" pitchFamily="18" charset="0"/>
-            </a:rPr>
-            <a:t>(Multiple reasons possible)</a:t>
-          </a:r>
+          <a:endParaRPr lang="en-US" sz="1400" b="0" kern="1200">
+            <a:latin typeface="Bodoni MT" panose="02070603080606020203" pitchFamily="18" charset="0"/>
+          </a:endParaRPr>
         </a:p>
       </dsp:txBody>
-      <dsp:txXfrm>
-        <a:off x="3498754" y="1134629"/>
-        <a:ext cx="1569501" cy="1206562"/>
+      <dsp:txXfrm rot="-5400000">
+        <a:off x="2032301" y="3683193"/>
+        <a:ext cx="244628" cy="237833"/>
       </dsp:txXfrm>
     </dsp:sp>
-    <dsp:sp modelId="{63E9F576-8E68-4A72-948C-B213FB07D931}">
+    <dsp:sp modelId="{4331F363-51FD-3A41-8B71-DF8ADF4A8B9F}">
       <dsp:nvSpPr>
         <dsp:cNvPr id="0" name=""/>
         <dsp:cNvSpPr/>
       </dsp:nvSpPr>
       <dsp:spPr>
         <a:xfrm>
-          <a:off x="5244631" y="251784"/>
-          <a:ext cx="1961877" cy="784750"/>
+          <a:off x="1231654" y="4079583"/>
+          <a:ext cx="1845920" cy="906032"/>
         </a:xfrm>
-        <a:prstGeom prst="chevron">
-          <a:avLst/>
+        <a:prstGeom prst="roundRect">
+          <a:avLst>
+            <a:gd name="adj" fmla="val 10000"/>
+          </a:avLst>
         </a:prstGeom>
         <a:solidFill>
-          <a:schemeClr val="lt1">
-            <a:hueOff val="0"/>
-            <a:satOff val="0"/>
-            <a:lumOff val="0"/>
-            <a:alphaOff val="0"/>
-          </a:schemeClr>
+          <a:srgbClr val="CCC6E2"/>
         </a:solidFill>
         <a:ln w="12700" cap="flat" cmpd="sng" algn="ctr">
           <a:solidFill>
-            <a:schemeClr val="dk1">
+            <a:prstClr val="black">
               <a:shade val="80000"/>
               <a:hueOff val="0"/>
               <a:satOff val="0"/>
               <a:lumOff val="0"/>
               <a:alphaOff val="0"/>
-            </a:schemeClr>
+            </a:prstClr>
           </a:solidFill>
           <a:prstDash val="solid"/>
           <a:miter lim="800000"/>
@@ -2342,12 +2053,12 @@
         </a:fontRef>
       </dsp:style>
       <dsp:txBody>
-        <a:bodyPr spcFirstLastPara="0" vert="horz" wrap="square" lIns="60008" tIns="20003" rIns="20003" bIns="20003" numCol="1" spcCol="1270" anchor="ctr" anchorCtr="0">
+        <a:bodyPr spcFirstLastPara="0" vert="horz" wrap="square" lIns="38100" tIns="38100" rIns="38100" bIns="38100" numCol="1" spcCol="1270" anchor="ctr" anchorCtr="0">
           <a:noAutofit/>
         </a:bodyPr>
         <a:lstStyle/>
         <a:p>
-          <a:pPr marL="0" lvl="0" indent="0" algn="ctr" defTabSz="666750">
+          <a:pPr marL="0" lvl="0" indent="0" algn="ctr" defTabSz="444500">
             <a:lnSpc>
               <a:spcPct val="90000"/>
             </a:lnSpc>
@@ -2360,17 +2071,24 @@
             <a:buNone/>
           </a:pPr>
           <a:r>
-            <a:rPr lang="en-US" sz="1500" b="1" kern="1200" dirty="0">
+            <a:rPr lang="en-US" sz="1400" b="0" kern="1200" dirty="0">
+              <a:solidFill>
+                <a:prstClr val="black">
+                  <a:hueOff val="0"/>
+                  <a:satOff val="0"/>
+                  <a:lumOff val="0"/>
+                  <a:alphaOff val="0"/>
+                </a:prstClr>
+              </a:solidFill>
               <a:latin typeface="Bodoni MT" panose="02070603080606020203" pitchFamily="18" charset="0"/>
+              <a:ea typeface="+mn-ea"/>
+              <a:cs typeface="+mn-cs"/>
             </a:rPr>
-            <a:t>450</a:t>
+            <a:t>Reports of new included studies</a:t>
           </a:r>
-          <a:endParaRPr lang="en-US" sz="1500" kern="1200" dirty="0">
-            <a:latin typeface="Bodoni MT" panose="02070603080606020203" pitchFamily="18" charset="0"/>
-          </a:endParaRPr>
         </a:p>
         <a:p>
-          <a:pPr marL="0" lvl="0" indent="0" algn="ctr" defTabSz="666750">
+          <a:pPr marL="0" lvl="0" indent="0" algn="ctr" defTabSz="444500">
             <a:lnSpc>
               <a:spcPct val="90000"/>
             </a:lnSpc>
@@ -2383,16 +2101,26 @@
             <a:buNone/>
           </a:pPr>
           <a:r>
-            <a:rPr lang="en-US" sz="1000" kern="1200" dirty="0">
+            <a:rPr lang="en-US" sz="1400" b="0" kern="1200" dirty="0">
+              <a:solidFill>
+                <a:prstClr val="black">
+                  <a:hueOff val="0"/>
+                  <a:satOff val="0"/>
+                  <a:lumOff val="0"/>
+                  <a:alphaOff val="0"/>
+                </a:prstClr>
+              </a:solidFill>
               <a:latin typeface="Bodoni MT" panose="02070603080606020203" pitchFamily="18" charset="0"/>
+              <a:ea typeface="+mn-ea"/>
+              <a:cs typeface="+mn-cs"/>
             </a:rPr>
-            <a:t>studies included</a:t>
+            <a:t>(n=450)</a:t>
           </a:r>
         </a:p>
       </dsp:txBody>
       <dsp:txXfrm>
-        <a:off x="5637006" y="251784"/>
-        <a:ext cx="1177127" cy="784750"/>
+        <a:off x="1258191" y="4106120"/>
+        <a:ext cx="1792846" cy="852958"/>
       </dsp:txXfrm>
     </dsp:sp>
   </dsp:spTree>
@@ -2400,11 +2128,11 @@
 </file>
 
 <file path=ppt/diagrams/layout1.xml><?xml version="1.0" encoding="utf-8"?>
-<dgm:layoutDef xmlns:dgm="http://schemas.openxmlformats.org/drawingml/2006/diagram" xmlns:a="http://schemas.openxmlformats.org/drawingml/2006/main" uniqueId="urn:microsoft.com/office/officeart/2005/8/layout/chevron1">
+<dgm:layoutDef xmlns:dgm="http://schemas.openxmlformats.org/drawingml/2006/diagram" xmlns:a="http://schemas.openxmlformats.org/drawingml/2006/main" uniqueId="urn:microsoft.com/office/officeart/2005/8/layout/process2">
   <dgm:title val=""/>
   <dgm:desc val=""/>
   <dgm:catLst>
-    <dgm:cat type="process" pri="9000"/>
+    <dgm:cat type="process" pri="13000"/>
   </dgm:catLst>
   <dgm:sampData useDef="1">
     <dgm:dataModel>
@@ -2447,237 +2175,103 @@
       <dgm:whole/>
     </dgm:dataModel>
   </dgm:clrData>
-  <dgm:layoutNode name="Name0">
+  <dgm:layoutNode name="linearFlow">
     <dgm:varLst>
-      <dgm:dir/>
-      <dgm:animLvl val="lvl"/>
       <dgm:resizeHandles val="exact"/>
     </dgm:varLst>
-    <dgm:choose name="Name1">
-      <dgm:if name="Name2" func="var" arg="dir" op="equ" val="norm">
-        <dgm:alg type="lin"/>
-      </dgm:if>
-      <dgm:else name="Name3">
-        <dgm:alg type="lin">
-          <dgm:param type="linDir" val="fromR"/>
-        </dgm:alg>
-      </dgm:else>
-    </dgm:choose>
+    <dgm:alg type="lin">
+      <dgm:param type="linDir" val="fromT"/>
+    </dgm:alg>
     <dgm:shape xmlns:r="http://schemas.openxmlformats.org/officeDocument/2006/relationships" r:blip="">
       <dgm:adjLst/>
     </dgm:shape>
     <dgm:presOf/>
-    <dgm:choose name="Name4">
-      <dgm:if name="Name5" axis="des" func="maxDepth" op="gte" val="2">
+    <dgm:constrLst>
+      <dgm:constr type="h" for="ch" ptType="node" refType="h"/>
+      <dgm:constr type="h" for="ch" ptType="sibTrans" refType="h" refFor="ch" refPtType="node" fact="0.5"/>
+      <dgm:constr type="w" for="ch" ptType="node" op="equ"/>
+      <dgm:constr type="primFontSz" for="ch" ptType="node" op="equ" val="65"/>
+      <dgm:constr type="primFontSz" for="des" forName="connectorText" op="equ" val="55"/>
+      <dgm:constr type="primFontSz" for="des" forName="connectorText" refType="primFontSz" refFor="ch" refPtType="node" op="lte" fact="0.8"/>
+    </dgm:constrLst>
+    <dgm:ruleLst/>
+    <dgm:forEach name="nodesForEach" axis="ch" ptType="node">
+      <dgm:layoutNode name="node">
+        <dgm:varLst>
+          <dgm:bulletEnabled val="1"/>
+        </dgm:varLst>
+        <dgm:choose name="Name0">
+          <dgm:if name="Name1" axis="root des" ptType="all node" func="maxDepth" op="gt" val="1">
+            <dgm:alg type="tx">
+              <dgm:param type="parTxLTRAlign" val="l"/>
+              <dgm:param type="parTxRTLAlign" val="r"/>
+              <dgm:param type="txAnchorVertCh" val="mid"/>
+            </dgm:alg>
+          </dgm:if>
+          <dgm:else name="Name2">
+            <dgm:alg type="tx"/>
+          </dgm:else>
+        </dgm:choose>
+        <dgm:shape xmlns:r="http://schemas.openxmlformats.org/officeDocument/2006/relationships" type="roundRect" r:blip="">
+          <dgm:adjLst>
+            <dgm:adj idx="1" val="0.1"/>
+          </dgm:adjLst>
+        </dgm:shape>
+        <dgm:presOf axis="desOrSelf" ptType="node"/>
         <dgm:constrLst>
-          <dgm:constr type="h" for="ch" forName="composite" refType="h"/>
-          <dgm:constr type="w" for="ch" forName="composite" refType="w"/>
-          <dgm:constr type="w" for="des" forName="parTx"/>
-          <dgm:constr type="h" for="des" forName="parTx" op="equ"/>
-          <dgm:constr type="w" for="des" forName="desTx"/>
-          <dgm:constr type="h" for="des" forName="desTx" op="equ"/>
-          <dgm:constr type="primFontSz" for="des" forName="parTx" val="65"/>
-          <dgm:constr type="secFontSz" for="des" forName="desTx" refType="primFontSz" refFor="des" refForName="parTx" op="equ"/>
-          <dgm:constr type="h" for="des" forName="parTx" refType="primFontSz" refFor="des" refForName="parTx" fact="1.5"/>
-          <dgm:constr type="h" for="des" forName="desTx" refType="primFontSz" refFor="des" refForName="parTx" fact="0.5"/>
-          <dgm:constr type="w" for="ch" forName="space" op="equ" val="-6"/>
+          <dgm:constr type="w" refType="h" fact="1.8"/>
+          <dgm:constr type="tMarg" refType="primFontSz" fact="0.3"/>
+          <dgm:constr type="bMarg" refType="primFontSz" fact="0.3"/>
+          <dgm:constr type="lMarg" refType="primFontSz" fact="0.3"/>
+          <dgm:constr type="rMarg" refType="primFontSz" fact="0.3"/>
         </dgm:constrLst>
         <dgm:ruleLst>
-          <dgm:rule type="w" for="ch" forName="composite" val="0" fact="NaN" max="NaN"/>
-          <dgm:rule type="primFontSz" for="des" forName="parTx" val="5" fact="NaN" max="NaN"/>
+          <dgm:rule type="primFontSz" val="18" fact="NaN" max="NaN"/>
+          <dgm:rule type="w" val="NaN" fact="4" max="NaN"/>
+          <dgm:rule type="primFontSz" val="5" fact="NaN" max="NaN"/>
         </dgm:ruleLst>
-        <dgm:forEach name="Name6" axis="ch" ptType="node">
-          <dgm:layoutNode name="composite">
-            <dgm:alg type="composite"/>
-            <dgm:shape xmlns:r="http://schemas.openxmlformats.org/officeDocument/2006/relationships" r:blip="">
+      </dgm:layoutNode>
+      <dgm:forEach name="sibTransForEach" axis="followSib" ptType="sibTrans" cnt="1">
+        <dgm:layoutNode name="sibTrans">
+          <dgm:alg type="conn">
+            <dgm:param type="begPts" val="auto"/>
+            <dgm:param type="endPts" val="auto"/>
+          </dgm:alg>
+          <dgm:shape xmlns:r="http://schemas.openxmlformats.org/officeDocument/2006/relationships" type="conn" r:blip="">
+            <dgm:adjLst/>
+          </dgm:shape>
+          <dgm:presOf axis="self"/>
+          <dgm:constrLst>
+            <dgm:constr type="w" refType="h" fact="0.9"/>
+            <dgm:constr type="connDist"/>
+            <dgm:constr type="wArH" refType="w" fact="0.5"/>
+            <dgm:constr type="hArH" refType="w"/>
+            <dgm:constr type="stemThick" refType="w" fact="0.6"/>
+            <dgm:constr type="begPad" refType="connDist" fact="0.125"/>
+            <dgm:constr type="endPad" refType="connDist" fact="0.125"/>
+          </dgm:constrLst>
+          <dgm:ruleLst/>
+          <dgm:layoutNode name="connectorText">
+            <dgm:alg type="tx">
+              <dgm:param type="autoTxRot" val="upr"/>
+            </dgm:alg>
+            <dgm:shape xmlns:r="http://schemas.openxmlformats.org/officeDocument/2006/relationships" type="conn" r:blip="" hideGeom="1">
               <dgm:adjLst/>
             </dgm:shape>
-            <dgm:presOf/>
-            <dgm:choose name="Name7">
-              <dgm:if name="Name8" func="var" arg="dir" op="equ" val="norm">
-                <dgm:constrLst>
-                  <dgm:constr type="l" for="ch" forName="parTx"/>
-                  <dgm:constr type="w" for="ch" forName="parTx" refType="w"/>
-                  <dgm:constr type="t" for="ch" forName="parTx"/>
-                  <dgm:constr type="l" for="ch" forName="desTx"/>
-                  <dgm:constr type="w" for="ch" forName="desTx" refType="w" refFor="ch" refForName="parTx" fact="0.8"/>
-                  <dgm:constr type="t" for="ch" forName="desTx" refType="h" refFor="ch" refForName="parTx" fact="1.125"/>
-                </dgm:constrLst>
-              </dgm:if>
-              <dgm:else name="Name9">
-                <dgm:constrLst>
-                  <dgm:constr type="l" for="ch" forName="parTx"/>
-                  <dgm:constr type="w" for="ch" forName="parTx" refType="w"/>
-                  <dgm:constr type="t" for="ch" forName="parTx"/>
-                  <dgm:constr type="l" for="ch" forName="desTx" refType="w" fact="0.2"/>
-                  <dgm:constr type="w" for="ch" forName="desTx" refType="w" refFor="ch" refForName="parTx" fact="0.8"/>
-                  <dgm:constr type="t" for="ch" forName="desTx" refType="h" refFor="ch" refForName="parTx" fact="1.125"/>
-                </dgm:constrLst>
-              </dgm:else>
-            </dgm:choose>
-            <dgm:ruleLst>
-              <dgm:rule type="h" val="INF" fact="NaN" max="NaN"/>
-            </dgm:ruleLst>
-            <dgm:layoutNode name="parTx">
-              <dgm:varLst>
-                <dgm:chMax val="0"/>
-                <dgm:chPref val="0"/>
-                <dgm:bulletEnabled val="1"/>
-              </dgm:varLst>
-              <dgm:alg type="tx"/>
-              <dgm:choose name="Name10">
-                <dgm:if name="Name11" func="var" arg="dir" op="equ" val="norm">
-                  <dgm:shape xmlns:r="http://schemas.openxmlformats.org/officeDocument/2006/relationships" type="chevron" r:blip="">
-                    <dgm:adjLst/>
-                  </dgm:shape>
-                </dgm:if>
-                <dgm:else name="Name12">
-                  <dgm:shape xmlns:r="http://schemas.openxmlformats.org/officeDocument/2006/relationships" rot="180" type="chevron" r:blip="">
-                    <dgm:adjLst/>
-                  </dgm:shape>
-                </dgm:else>
-              </dgm:choose>
-              <dgm:presOf axis="self" ptType="node"/>
-              <dgm:choose name="Name13">
-                <dgm:if name="Name14" func="var" arg="dir" op="equ" val="norm">
-                  <dgm:constrLst>
-                    <dgm:constr type="h" refType="w" op="lte" fact="0.4"/>
-                    <dgm:constr type="h"/>
-                    <dgm:constr type="tMarg" refType="primFontSz" fact="0.105"/>
-                    <dgm:constr type="bMarg" refType="primFontSz" fact="0.105"/>
-                    <dgm:constr type="lMarg" refType="primFontSz" fact="0.315"/>
-                    <dgm:constr type="rMarg" refType="primFontSz" fact="0.105"/>
-                  </dgm:constrLst>
-                </dgm:if>
-                <dgm:else name="Name15">
-                  <dgm:constrLst>
-                    <dgm:constr type="h" refType="w" op="lte" fact="0.4"/>
-                    <dgm:constr type="h"/>
-                    <dgm:constr type="tMarg" refType="primFontSz" fact="0.105"/>
-                    <dgm:constr type="bMarg" refType="primFontSz" fact="0.105"/>
-                    <dgm:constr type="lMarg" refType="primFontSz" fact="0.105"/>
-                    <dgm:constr type="rMarg" refType="primFontSz" fact="0.315"/>
-                  </dgm:constrLst>
-                </dgm:else>
-              </dgm:choose>
-              <dgm:ruleLst>
-                <dgm:rule type="h" val="INF" fact="NaN" max="NaN"/>
-              </dgm:ruleLst>
-            </dgm:layoutNode>
-            <dgm:layoutNode name="desTx" styleLbl="revTx">
-              <dgm:varLst>
-                <dgm:bulletEnabled val="1"/>
-              </dgm:varLst>
-              <dgm:alg type="tx">
-                <dgm:param type="stBulletLvl" val="1"/>
-              </dgm:alg>
-              <dgm:choose name="Name16">
-                <dgm:if name="Name17" axis="ch" ptType="node" func="cnt" op="gte" val="1">
-                  <dgm:shape xmlns:r="http://schemas.openxmlformats.org/officeDocument/2006/relationships" type="rect" r:blip="">
-                    <dgm:adjLst/>
-                  </dgm:shape>
-                </dgm:if>
-                <dgm:else name="Name18">
-                  <dgm:shape xmlns:r="http://schemas.openxmlformats.org/officeDocument/2006/relationships" type="rect" r:blip="" hideGeom="1">
-                    <dgm:adjLst/>
-                  </dgm:shape>
-                </dgm:else>
-              </dgm:choose>
-              <dgm:presOf axis="des" ptType="node"/>
-              <dgm:constrLst>
-                <dgm:constr type="secFontSz" val="65"/>
-                <dgm:constr type="primFontSz" refType="secFontSz"/>
-                <dgm:constr type="h"/>
-                <dgm:constr type="tMarg"/>
-                <dgm:constr type="bMarg"/>
-                <dgm:constr type="rMarg"/>
-                <dgm:constr type="lMarg"/>
-              </dgm:constrLst>
-              <dgm:ruleLst>
-                <dgm:rule type="h" val="INF" fact="NaN" max="NaN"/>
-              </dgm:ruleLst>
-            </dgm:layoutNode>
-          </dgm:layoutNode>
-          <dgm:forEach name="Name19" axis="followSib" ptType="sibTrans" cnt="1">
-            <dgm:layoutNode name="space">
-              <dgm:alg type="sp"/>
-              <dgm:shape xmlns:r="http://schemas.openxmlformats.org/officeDocument/2006/relationships" r:blip="">
-                <dgm:adjLst/>
-              </dgm:shape>
-              <dgm:presOf/>
-              <dgm:constrLst/>
-              <dgm:ruleLst/>
-            </dgm:layoutNode>
-          </dgm:forEach>
-        </dgm:forEach>
-      </dgm:if>
-      <dgm:else name="Name20">
-        <dgm:constrLst>
-          <dgm:constr type="w" for="ch" forName="parTxOnly" refType="w"/>
-          <dgm:constr type="h" for="des" forName="parTxOnly" op="equ"/>
-          <dgm:constr type="primFontSz" for="des" forName="parTxOnly" op="equ" val="65"/>
-          <dgm:constr type="w" for="ch" forName="parTxOnlySpace" refType="w" refFor="ch" refForName="parTxOnly" fact="-0.1"/>
-        </dgm:constrLst>
-        <dgm:ruleLst/>
-        <dgm:forEach name="Name21" axis="ch" ptType="node">
-          <dgm:layoutNode name="parTxOnly">
-            <dgm:varLst>
-              <dgm:chMax val="0"/>
-              <dgm:chPref val="0"/>
-              <dgm:bulletEnabled val="1"/>
-            </dgm:varLst>
-            <dgm:alg type="tx"/>
-            <dgm:choose name="Name22">
-              <dgm:if name="Name23" func="var" arg="dir" op="equ" val="norm">
-                <dgm:shape xmlns:r="http://schemas.openxmlformats.org/officeDocument/2006/relationships" type="chevron" r:blip="">
-                  <dgm:adjLst/>
-                </dgm:shape>
-              </dgm:if>
-              <dgm:else name="Name24">
-                <dgm:shape xmlns:r="http://schemas.openxmlformats.org/officeDocument/2006/relationships" rot="180" type="chevron" r:blip="">
-                  <dgm:adjLst/>
-                </dgm:shape>
-              </dgm:else>
-            </dgm:choose>
-            <dgm:presOf axis="self" ptType="node"/>
-            <dgm:choose name="Name25">
-              <dgm:if name="Name26" func="var" arg="dir" op="equ" val="norm">
-                <dgm:constrLst>
-                  <dgm:constr type="h" refType="w" op="equ" fact="0.4"/>
-                  <dgm:constr type="tMarg" refType="primFontSz" fact="0.105"/>
-                  <dgm:constr type="bMarg" refType="primFontSz" fact="0.105"/>
-                  <dgm:constr type="lMarg" refType="primFontSz" fact="0.315"/>
-                  <dgm:constr type="rMarg" refType="primFontSz" fact="0.105"/>
-                </dgm:constrLst>
-              </dgm:if>
-              <dgm:else name="Name27">
-                <dgm:constrLst>
-                  <dgm:constr type="h" refType="w" op="equ" fact="0.4"/>
-                  <dgm:constr type="tMarg" refType="primFontSz" fact="0.105"/>
-                  <dgm:constr type="bMarg" refType="primFontSz" fact="0.105"/>
-                  <dgm:constr type="lMarg" refType="primFontSz" fact="0.105"/>
-                  <dgm:constr type="rMarg" refType="primFontSz" fact="0.315"/>
-                </dgm:constrLst>
-              </dgm:else>
-            </dgm:choose>
+            <dgm:presOf axis="self"/>
+            <dgm:constrLst>
+              <dgm:constr type="lMarg"/>
+              <dgm:constr type="rMarg"/>
+              <dgm:constr type="tMarg"/>
+              <dgm:constr type="bMarg"/>
+            </dgm:constrLst>
             <dgm:ruleLst>
               <dgm:rule type="primFontSz" val="5" fact="NaN" max="NaN"/>
             </dgm:ruleLst>
           </dgm:layoutNode>
-          <dgm:forEach name="Name28" axis="followSib" ptType="sibTrans" cnt="1">
-            <dgm:layoutNode name="parTxOnlySpace">
-              <dgm:alg type="sp"/>
-              <dgm:shape xmlns:r="http://schemas.openxmlformats.org/officeDocument/2006/relationships" r:blip="">
-                <dgm:adjLst/>
-              </dgm:shape>
-              <dgm:presOf/>
-              <dgm:constrLst/>
-              <dgm:ruleLst/>
-            </dgm:layoutNode>
-          </dgm:forEach>
-        </dgm:forEach>
-      </dgm:else>
-    </dgm:choose>
+        </dgm:layoutNode>
+      </dgm:forEach>
+    </dgm:forEach>
   </dgm:layoutNode>
 </dgm:layoutDef>
 </file>
@@ -3865,7 +3459,7 @@
           <a:p>
             <a:fld id="{4105D68D-A848-48D9-AC97-91B30B8D5097}" type="datetimeFigureOut">
               <a:rPr lang="en-US" smtClean="0"/>
-              <a:t>6/22/2022</a:t>
+              <a:t>2/16/23</a:t>
             </a:fld>
             <a:endParaRPr lang="en-US"/>
           </a:p>
@@ -3919,7 +3513,7 @@
           <a:p>
             <a:fld id="{398D3A7D-3022-4DEB-A97D-901235B1C59F}" type="slidenum">
               <a:rPr lang="en-US" smtClean="0"/>
-              <a:t>‹Nr.›</a:t>
+              <a:t>‹#›</a:t>
             </a:fld>
             <a:endParaRPr lang="en-US"/>
           </a:p>
@@ -4065,7 +3659,7 @@
           <a:p>
             <a:fld id="{4105D68D-A848-48D9-AC97-91B30B8D5097}" type="datetimeFigureOut">
               <a:rPr lang="en-US" smtClean="0"/>
-              <a:t>6/22/2022</a:t>
+              <a:t>2/16/23</a:t>
             </a:fld>
             <a:endParaRPr lang="en-US"/>
           </a:p>
@@ -4119,7 +3713,7 @@
           <a:p>
             <a:fld id="{398D3A7D-3022-4DEB-A97D-901235B1C59F}" type="slidenum">
               <a:rPr lang="en-US" smtClean="0"/>
-              <a:t>‹Nr.›</a:t>
+              <a:t>‹#›</a:t>
             </a:fld>
             <a:endParaRPr lang="en-US"/>
           </a:p>
@@ -4275,7 +3869,7 @@
           <a:p>
             <a:fld id="{4105D68D-A848-48D9-AC97-91B30B8D5097}" type="datetimeFigureOut">
               <a:rPr lang="en-US" smtClean="0"/>
-              <a:t>6/22/2022</a:t>
+              <a:t>2/16/23</a:t>
             </a:fld>
             <a:endParaRPr lang="en-US"/>
           </a:p>
@@ -4329,7 +3923,7 @@
           <a:p>
             <a:fld id="{398D3A7D-3022-4DEB-A97D-901235B1C59F}" type="slidenum">
               <a:rPr lang="en-US" smtClean="0"/>
-              <a:t>‹Nr.›</a:t>
+              <a:t>‹#›</a:t>
             </a:fld>
             <a:endParaRPr lang="en-US"/>
           </a:p>
@@ -4475,7 +4069,7 @@
           <a:p>
             <a:fld id="{4105D68D-A848-48D9-AC97-91B30B8D5097}" type="datetimeFigureOut">
               <a:rPr lang="en-US" smtClean="0"/>
-              <a:t>6/22/2022</a:t>
+              <a:t>2/16/23</a:t>
             </a:fld>
             <a:endParaRPr lang="en-US"/>
           </a:p>
@@ -4529,7 +4123,7 @@
           <a:p>
             <a:fld id="{398D3A7D-3022-4DEB-A97D-901235B1C59F}" type="slidenum">
               <a:rPr lang="en-US" smtClean="0"/>
-              <a:t>‹Nr.›</a:t>
+              <a:t>‹#›</a:t>
             </a:fld>
             <a:endParaRPr lang="en-US"/>
           </a:p>
@@ -4751,7 +4345,7 @@
           <a:p>
             <a:fld id="{4105D68D-A848-48D9-AC97-91B30B8D5097}" type="datetimeFigureOut">
               <a:rPr lang="en-US" smtClean="0"/>
-              <a:t>6/22/2022</a:t>
+              <a:t>2/16/23</a:t>
             </a:fld>
             <a:endParaRPr lang="en-US"/>
           </a:p>
@@ -4805,7 +4399,7 @@
           <a:p>
             <a:fld id="{398D3A7D-3022-4DEB-A97D-901235B1C59F}" type="slidenum">
               <a:rPr lang="en-US" smtClean="0"/>
-              <a:t>‹Nr.›</a:t>
+              <a:t>‹#›</a:t>
             </a:fld>
             <a:endParaRPr lang="en-US"/>
           </a:p>
@@ -5019,7 +4613,7 @@
           <a:p>
             <a:fld id="{4105D68D-A848-48D9-AC97-91B30B8D5097}" type="datetimeFigureOut">
               <a:rPr lang="en-US" smtClean="0"/>
-              <a:t>6/22/2022</a:t>
+              <a:t>2/16/23</a:t>
             </a:fld>
             <a:endParaRPr lang="en-US"/>
           </a:p>
@@ -5073,7 +4667,7 @@
           <a:p>
             <a:fld id="{398D3A7D-3022-4DEB-A97D-901235B1C59F}" type="slidenum">
               <a:rPr lang="en-US" smtClean="0"/>
-              <a:t>‹Nr.›</a:t>
+              <a:t>‹#›</a:t>
             </a:fld>
             <a:endParaRPr lang="en-US"/>
           </a:p>
@@ -5434,7 +5028,7 @@
           <a:p>
             <a:fld id="{4105D68D-A848-48D9-AC97-91B30B8D5097}" type="datetimeFigureOut">
               <a:rPr lang="en-US" smtClean="0"/>
-              <a:t>6/22/2022</a:t>
+              <a:t>2/16/23</a:t>
             </a:fld>
             <a:endParaRPr lang="en-US"/>
           </a:p>
@@ -5488,7 +5082,7 @@
           <a:p>
             <a:fld id="{398D3A7D-3022-4DEB-A97D-901235B1C59F}" type="slidenum">
               <a:rPr lang="en-US" smtClean="0"/>
-              <a:t>‹Nr.›</a:t>
+              <a:t>‹#›</a:t>
             </a:fld>
             <a:endParaRPr lang="en-US"/>
           </a:p>
@@ -5576,7 +5170,7 @@
           <a:p>
             <a:fld id="{4105D68D-A848-48D9-AC97-91B30B8D5097}" type="datetimeFigureOut">
               <a:rPr lang="en-US" smtClean="0"/>
-              <a:t>6/22/2022</a:t>
+              <a:t>2/16/23</a:t>
             </a:fld>
             <a:endParaRPr lang="en-US"/>
           </a:p>
@@ -5630,7 +5224,7 @@
           <a:p>
             <a:fld id="{398D3A7D-3022-4DEB-A97D-901235B1C59F}" type="slidenum">
               <a:rPr lang="en-US" smtClean="0"/>
-              <a:t>‹Nr.›</a:t>
+              <a:t>‹#›</a:t>
             </a:fld>
             <a:endParaRPr lang="en-US"/>
           </a:p>
@@ -5689,7 +5283,7 @@
           <a:p>
             <a:fld id="{4105D68D-A848-48D9-AC97-91B30B8D5097}" type="datetimeFigureOut">
               <a:rPr lang="en-US" smtClean="0"/>
-              <a:t>6/22/2022</a:t>
+              <a:t>2/16/23</a:t>
             </a:fld>
             <a:endParaRPr lang="en-US"/>
           </a:p>
@@ -5743,7 +5337,7 @@
           <a:p>
             <a:fld id="{398D3A7D-3022-4DEB-A97D-901235B1C59F}" type="slidenum">
               <a:rPr lang="en-US" smtClean="0"/>
-              <a:t>‹Nr.›</a:t>
+              <a:t>‹#›</a:t>
             </a:fld>
             <a:endParaRPr lang="en-US"/>
           </a:p>
@@ -6002,7 +5596,7 @@
           <a:p>
             <a:fld id="{4105D68D-A848-48D9-AC97-91B30B8D5097}" type="datetimeFigureOut">
               <a:rPr lang="en-US" smtClean="0"/>
-              <a:t>6/22/2022</a:t>
+              <a:t>2/16/23</a:t>
             </a:fld>
             <a:endParaRPr lang="en-US"/>
           </a:p>
@@ -6056,7 +5650,7 @@
           <a:p>
             <a:fld id="{398D3A7D-3022-4DEB-A97D-901235B1C59F}" type="slidenum">
               <a:rPr lang="en-US" smtClean="0"/>
-              <a:t>‹Nr.›</a:t>
+              <a:t>‹#›</a:t>
             </a:fld>
             <a:endParaRPr lang="en-US"/>
           </a:p>
@@ -6291,7 +5885,7 @@
           <a:p>
             <a:fld id="{4105D68D-A848-48D9-AC97-91B30B8D5097}" type="datetimeFigureOut">
               <a:rPr lang="en-US" smtClean="0"/>
-              <a:t>6/22/2022</a:t>
+              <a:t>2/16/23</a:t>
             </a:fld>
             <a:endParaRPr lang="en-US"/>
           </a:p>
@@ -6345,7 +5939,7 @@
           <a:p>
             <a:fld id="{398D3A7D-3022-4DEB-A97D-901235B1C59F}" type="slidenum">
               <a:rPr lang="en-US" smtClean="0"/>
-              <a:t>‹Nr.›</a:t>
+              <a:t>‹#›</a:t>
             </a:fld>
             <a:endParaRPr lang="en-US"/>
           </a:p>
@@ -6534,7 +6128,7 @@
           <a:p>
             <a:fld id="{4105D68D-A848-48D9-AC97-91B30B8D5097}" type="datetimeFigureOut">
               <a:rPr lang="en-US" smtClean="0"/>
-              <a:t>6/22/2022</a:t>
+              <a:t>2/16/23</a:t>
             </a:fld>
             <a:endParaRPr lang="en-US"/>
           </a:p>
@@ -6624,7 +6218,7 @@
           <a:p>
             <a:fld id="{398D3A7D-3022-4DEB-A97D-901235B1C59F}" type="slidenum">
               <a:rPr lang="en-US" smtClean="0"/>
-              <a:t>‹Nr.›</a:t>
+              <a:t>‹#›</a:t>
             </a:fld>
             <a:endParaRPr lang="en-US"/>
           </a:p>
@@ -6964,14 +6558,14 @@
           <p:nvPr>
             <p:extLst>
               <p:ext uri="{D42A27DB-BD31-4B8C-83A1-F6EECF244321}">
-                <p14:modId xmlns:p14="http://schemas.microsoft.com/office/powerpoint/2010/main" val="3844012355"/>
+                <p14:modId xmlns:p14="http://schemas.microsoft.com/office/powerpoint/2010/main" val="2887635414"/>
               </p:ext>
             </p:extLst>
           </p:nvPr>
         </p:nvGraphicFramePr>
         <p:xfrm>
-          <a:off x="1534522" y="1612445"/>
-          <a:ext cx="7213509" cy="2592977"/>
+          <a:off x="1051047" y="761107"/>
+          <a:ext cx="4309230" cy="4988052"/>
         </p:xfrm>
         <a:graphic>
           <a:graphicData uri="http://schemas.openxmlformats.org/drawingml/2006/diagram">
@@ -6979,6 +6573,744 @@
           </a:graphicData>
         </a:graphic>
       </p:graphicFrame>
+      <p:grpSp>
+        <p:nvGrpSpPr>
+          <p:cNvPr id="5" name="Group 4">
+            <a:extLst>
+              <a:ext uri="{FF2B5EF4-FFF2-40B4-BE49-F238E27FC236}">
+                <a16:creationId xmlns:a16="http://schemas.microsoft.com/office/drawing/2014/main" id="{F83D4A0A-5DEB-7B79-C2E6-E99CF1939068}"/>
+              </a:ext>
+            </a:extLst>
+          </p:cNvPr>
+          <p:cNvGrpSpPr/>
+          <p:nvPr/>
+        </p:nvGrpSpPr>
+        <p:grpSpPr>
+          <a:xfrm rot="16200000">
+            <a:off x="4168648" y="999563"/>
+            <a:ext cx="407316" cy="339430"/>
+            <a:chOff x="1950956" y="966588"/>
+            <a:chExt cx="407316" cy="339430"/>
+          </a:xfrm>
+        </p:grpSpPr>
+        <p:sp>
+          <p:nvSpPr>
+            <p:cNvPr id="6" name="Right Arrow 5">
+              <a:extLst>
+                <a:ext uri="{FF2B5EF4-FFF2-40B4-BE49-F238E27FC236}">
+                  <a16:creationId xmlns:a16="http://schemas.microsoft.com/office/drawing/2014/main" id="{BA19D177-1F3F-DE98-794E-18B3A254A900}"/>
+                </a:ext>
+              </a:extLst>
+            </p:cNvPr>
+            <p:cNvSpPr/>
+            <p:nvPr/>
+          </p:nvSpPr>
+          <p:spPr>
+            <a:xfrm rot="5400000">
+              <a:off x="1984899" y="932645"/>
+              <a:ext cx="339430" cy="407316"/>
+            </a:xfrm>
+            <a:prstGeom prst="rightArrow">
+              <a:avLst>
+                <a:gd name="adj1" fmla="val 60000"/>
+                <a:gd name="adj2" fmla="val 50000"/>
+              </a:avLst>
+            </a:prstGeom>
+          </p:spPr>
+          <p:style>
+            <a:lnRef idx="0">
+              <a:schemeClr val="dk1">
+                <a:tint val="60000"/>
+                <a:hueOff val="0"/>
+                <a:satOff val="0"/>
+                <a:lumOff val="0"/>
+                <a:alphaOff val="0"/>
+              </a:schemeClr>
+            </a:lnRef>
+            <a:fillRef idx="1">
+              <a:schemeClr val="dk1">
+                <a:tint val="60000"/>
+                <a:hueOff val="0"/>
+                <a:satOff val="0"/>
+                <a:lumOff val="0"/>
+                <a:alphaOff val="0"/>
+              </a:schemeClr>
+            </a:fillRef>
+            <a:effectRef idx="0">
+              <a:schemeClr val="dk1">
+                <a:tint val="60000"/>
+                <a:hueOff val="0"/>
+                <a:satOff val="0"/>
+                <a:lumOff val="0"/>
+                <a:alphaOff val="0"/>
+              </a:schemeClr>
+            </a:effectRef>
+            <a:fontRef idx="minor">
+              <a:schemeClr val="dk1">
+                <a:hueOff val="0"/>
+                <a:satOff val="0"/>
+                <a:lumOff val="0"/>
+                <a:alphaOff val="0"/>
+              </a:schemeClr>
+            </a:fontRef>
+          </p:style>
+        </p:sp>
+        <p:sp>
+          <p:nvSpPr>
+            <p:cNvPr id="7" name="Right Arrow 4">
+              <a:extLst>
+                <a:ext uri="{FF2B5EF4-FFF2-40B4-BE49-F238E27FC236}">
+                  <a16:creationId xmlns:a16="http://schemas.microsoft.com/office/drawing/2014/main" id="{D2BDD0EE-2E15-0760-F407-BE9F16BC4940}"/>
+                </a:ext>
+              </a:extLst>
+            </p:cNvPr>
+            <p:cNvSpPr txBox="1"/>
+            <p:nvPr/>
+          </p:nvSpPr>
+          <p:spPr>
+            <a:xfrm>
+              <a:off x="2032420" y="966588"/>
+              <a:ext cx="244390" cy="237601"/>
+            </a:xfrm>
+            <a:prstGeom prst="rect">
+              <a:avLst/>
+            </a:prstGeom>
+          </p:spPr>
+          <p:style>
+            <a:lnRef idx="0">
+              <a:scrgbClr r="0" g="0" b="0"/>
+            </a:lnRef>
+            <a:fillRef idx="0">
+              <a:scrgbClr r="0" g="0" b="0"/>
+            </a:fillRef>
+            <a:effectRef idx="0">
+              <a:scrgbClr r="0" g="0" b="0"/>
+            </a:effectRef>
+            <a:fontRef idx="minor">
+              <a:schemeClr val="dk1">
+                <a:hueOff val="0"/>
+                <a:satOff val="0"/>
+                <a:lumOff val="0"/>
+                <a:alphaOff val="0"/>
+              </a:schemeClr>
+            </a:fontRef>
+          </p:style>
+          <p:txBody>
+            <a:bodyPr spcFirstLastPara="0" vert="horz" wrap="square" lIns="0" tIns="0" rIns="0" bIns="0" numCol="1" spcCol="1270" anchor="ctr" anchorCtr="0">
+              <a:noAutofit/>
+            </a:bodyPr>
+            <a:lstStyle/>
+            <a:p>
+              <a:pPr marL="0" lvl="0" indent="0" algn="ctr" defTabSz="755650" rtl="0">
+                <a:lnSpc>
+                  <a:spcPct val="90000"/>
+                </a:lnSpc>
+                <a:spcBef>
+                  <a:spcPct val="0"/>
+                </a:spcBef>
+                <a:spcAft>
+                  <a:spcPct val="35000"/>
+                </a:spcAft>
+                <a:buNone/>
+              </a:pPr>
+              <a:endParaRPr lang="en-US" sz="1400" kern="1200">
+                <a:latin typeface="Bodoni MT" panose="02070603080606020203" pitchFamily="18" charset="77"/>
+              </a:endParaRPr>
+            </a:p>
+          </p:txBody>
+        </p:sp>
+      </p:grpSp>
+      <p:grpSp>
+        <p:nvGrpSpPr>
+          <p:cNvPr id="10" name="Group 9">
+            <a:extLst>
+              <a:ext uri="{FF2B5EF4-FFF2-40B4-BE49-F238E27FC236}">
+                <a16:creationId xmlns:a16="http://schemas.microsoft.com/office/drawing/2014/main" id="{D1D7D00E-D081-9CF8-6EA2-72EEDD832E9E}"/>
+              </a:ext>
+            </a:extLst>
+          </p:cNvPr>
+          <p:cNvGrpSpPr/>
+          <p:nvPr/>
+        </p:nvGrpSpPr>
+        <p:grpSpPr>
+          <a:xfrm rot="16200000">
+            <a:off x="4206812" y="2352034"/>
+            <a:ext cx="407316" cy="339430"/>
+            <a:chOff x="1950956" y="966588"/>
+            <a:chExt cx="407316" cy="339430"/>
+          </a:xfrm>
+        </p:grpSpPr>
+        <p:sp>
+          <p:nvSpPr>
+            <p:cNvPr id="11" name="Right Arrow 10">
+              <a:extLst>
+                <a:ext uri="{FF2B5EF4-FFF2-40B4-BE49-F238E27FC236}">
+                  <a16:creationId xmlns:a16="http://schemas.microsoft.com/office/drawing/2014/main" id="{8DB93197-452A-08ED-CA80-799282917C6B}"/>
+                </a:ext>
+              </a:extLst>
+            </p:cNvPr>
+            <p:cNvSpPr/>
+            <p:nvPr/>
+          </p:nvSpPr>
+          <p:spPr>
+            <a:xfrm rot="5400000">
+              <a:off x="1984899" y="932645"/>
+              <a:ext cx="339430" cy="407316"/>
+            </a:xfrm>
+            <a:prstGeom prst="rightArrow">
+              <a:avLst>
+                <a:gd name="adj1" fmla="val 60000"/>
+                <a:gd name="adj2" fmla="val 50000"/>
+              </a:avLst>
+            </a:prstGeom>
+          </p:spPr>
+          <p:style>
+            <a:lnRef idx="0">
+              <a:schemeClr val="dk1">
+                <a:tint val="60000"/>
+                <a:hueOff val="0"/>
+                <a:satOff val="0"/>
+                <a:lumOff val="0"/>
+                <a:alphaOff val="0"/>
+              </a:schemeClr>
+            </a:lnRef>
+            <a:fillRef idx="1">
+              <a:schemeClr val="dk1">
+                <a:tint val="60000"/>
+                <a:hueOff val="0"/>
+                <a:satOff val="0"/>
+                <a:lumOff val="0"/>
+                <a:alphaOff val="0"/>
+              </a:schemeClr>
+            </a:fillRef>
+            <a:effectRef idx="0">
+              <a:schemeClr val="dk1">
+                <a:tint val="60000"/>
+                <a:hueOff val="0"/>
+                <a:satOff val="0"/>
+                <a:lumOff val="0"/>
+                <a:alphaOff val="0"/>
+              </a:schemeClr>
+            </a:effectRef>
+            <a:fontRef idx="minor">
+              <a:schemeClr val="dk1">
+                <a:hueOff val="0"/>
+                <a:satOff val="0"/>
+                <a:lumOff val="0"/>
+                <a:alphaOff val="0"/>
+              </a:schemeClr>
+            </a:fontRef>
+          </p:style>
+        </p:sp>
+        <p:sp>
+          <p:nvSpPr>
+            <p:cNvPr id="12" name="Right Arrow 4">
+              <a:extLst>
+                <a:ext uri="{FF2B5EF4-FFF2-40B4-BE49-F238E27FC236}">
+                  <a16:creationId xmlns:a16="http://schemas.microsoft.com/office/drawing/2014/main" id="{D34AA128-1410-310B-22F0-2193E2C6645F}"/>
+                </a:ext>
+              </a:extLst>
+            </p:cNvPr>
+            <p:cNvSpPr txBox="1"/>
+            <p:nvPr/>
+          </p:nvSpPr>
+          <p:spPr>
+            <a:xfrm>
+              <a:off x="2032420" y="966588"/>
+              <a:ext cx="244390" cy="237601"/>
+            </a:xfrm>
+            <a:prstGeom prst="rect">
+              <a:avLst/>
+            </a:prstGeom>
+          </p:spPr>
+          <p:style>
+            <a:lnRef idx="0">
+              <a:scrgbClr r="0" g="0" b="0"/>
+            </a:lnRef>
+            <a:fillRef idx="0">
+              <a:scrgbClr r="0" g="0" b="0"/>
+            </a:fillRef>
+            <a:effectRef idx="0">
+              <a:scrgbClr r="0" g="0" b="0"/>
+            </a:effectRef>
+            <a:fontRef idx="minor">
+              <a:schemeClr val="dk1">
+                <a:hueOff val="0"/>
+                <a:satOff val="0"/>
+                <a:lumOff val="0"/>
+                <a:alphaOff val="0"/>
+              </a:schemeClr>
+            </a:fontRef>
+          </p:style>
+          <p:txBody>
+            <a:bodyPr spcFirstLastPara="0" vert="horz" wrap="square" lIns="0" tIns="0" rIns="0" bIns="0" numCol="1" spcCol="1270" anchor="ctr" anchorCtr="0">
+              <a:noAutofit/>
+            </a:bodyPr>
+            <a:lstStyle/>
+            <a:p>
+              <a:pPr marL="0" lvl="0" indent="0" algn="ctr" defTabSz="755650" rtl="0">
+                <a:lnSpc>
+                  <a:spcPct val="90000"/>
+                </a:lnSpc>
+                <a:spcBef>
+                  <a:spcPct val="0"/>
+                </a:spcBef>
+                <a:spcAft>
+                  <a:spcPct val="35000"/>
+                </a:spcAft>
+                <a:buNone/>
+              </a:pPr>
+              <a:endParaRPr lang="en-US" sz="1400" kern="1200">
+                <a:latin typeface="Bodoni MT" panose="02070603080606020203" pitchFamily="18" charset="77"/>
+              </a:endParaRPr>
+            </a:p>
+          </p:txBody>
+        </p:sp>
+      </p:grpSp>
+      <p:grpSp>
+        <p:nvGrpSpPr>
+          <p:cNvPr id="16" name="Group 15">
+            <a:extLst>
+              <a:ext uri="{FF2B5EF4-FFF2-40B4-BE49-F238E27FC236}">
+                <a16:creationId xmlns:a16="http://schemas.microsoft.com/office/drawing/2014/main" id="{B0A27C57-8D6D-9D82-77E0-8F95C27ABCE6}"/>
+              </a:ext>
+            </a:extLst>
+          </p:cNvPr>
+          <p:cNvGrpSpPr/>
+          <p:nvPr/>
+        </p:nvGrpSpPr>
+        <p:grpSpPr>
+          <a:xfrm rot="16200000">
+            <a:off x="4204572" y="3796903"/>
+            <a:ext cx="407316" cy="339430"/>
+            <a:chOff x="1950956" y="966588"/>
+            <a:chExt cx="407316" cy="339430"/>
+          </a:xfrm>
+        </p:grpSpPr>
+        <p:sp>
+          <p:nvSpPr>
+            <p:cNvPr id="17" name="Right Arrow 16">
+              <a:extLst>
+                <a:ext uri="{FF2B5EF4-FFF2-40B4-BE49-F238E27FC236}">
+                  <a16:creationId xmlns:a16="http://schemas.microsoft.com/office/drawing/2014/main" id="{FCE05518-5528-D253-E19B-4DC7C8D3BBDE}"/>
+                </a:ext>
+              </a:extLst>
+            </p:cNvPr>
+            <p:cNvSpPr/>
+            <p:nvPr/>
+          </p:nvSpPr>
+          <p:spPr>
+            <a:xfrm rot="5400000">
+              <a:off x="1984899" y="932645"/>
+              <a:ext cx="339430" cy="407316"/>
+            </a:xfrm>
+            <a:prstGeom prst="rightArrow">
+              <a:avLst>
+                <a:gd name="adj1" fmla="val 60000"/>
+                <a:gd name="adj2" fmla="val 50000"/>
+              </a:avLst>
+            </a:prstGeom>
+          </p:spPr>
+          <p:style>
+            <a:lnRef idx="0">
+              <a:schemeClr val="dk1">
+                <a:tint val="60000"/>
+                <a:hueOff val="0"/>
+                <a:satOff val="0"/>
+                <a:lumOff val="0"/>
+                <a:alphaOff val="0"/>
+              </a:schemeClr>
+            </a:lnRef>
+            <a:fillRef idx="1">
+              <a:schemeClr val="dk1">
+                <a:tint val="60000"/>
+                <a:hueOff val="0"/>
+                <a:satOff val="0"/>
+                <a:lumOff val="0"/>
+                <a:alphaOff val="0"/>
+              </a:schemeClr>
+            </a:fillRef>
+            <a:effectRef idx="0">
+              <a:schemeClr val="dk1">
+                <a:tint val="60000"/>
+                <a:hueOff val="0"/>
+                <a:satOff val="0"/>
+                <a:lumOff val="0"/>
+                <a:alphaOff val="0"/>
+              </a:schemeClr>
+            </a:effectRef>
+            <a:fontRef idx="minor">
+              <a:schemeClr val="dk1">
+                <a:hueOff val="0"/>
+                <a:satOff val="0"/>
+                <a:lumOff val="0"/>
+                <a:alphaOff val="0"/>
+              </a:schemeClr>
+            </a:fontRef>
+          </p:style>
+        </p:sp>
+        <p:sp>
+          <p:nvSpPr>
+            <p:cNvPr id="18" name="Right Arrow 4">
+              <a:extLst>
+                <a:ext uri="{FF2B5EF4-FFF2-40B4-BE49-F238E27FC236}">
+                  <a16:creationId xmlns:a16="http://schemas.microsoft.com/office/drawing/2014/main" id="{597D6300-F239-776E-9925-BDB215DBDCEA}"/>
+                </a:ext>
+              </a:extLst>
+            </p:cNvPr>
+            <p:cNvSpPr txBox="1"/>
+            <p:nvPr/>
+          </p:nvSpPr>
+          <p:spPr>
+            <a:xfrm>
+              <a:off x="2032420" y="966588"/>
+              <a:ext cx="244390" cy="237601"/>
+            </a:xfrm>
+            <a:prstGeom prst="rect">
+              <a:avLst/>
+            </a:prstGeom>
+          </p:spPr>
+          <p:style>
+            <a:lnRef idx="0">
+              <a:scrgbClr r="0" g="0" b="0"/>
+            </a:lnRef>
+            <a:fillRef idx="0">
+              <a:scrgbClr r="0" g="0" b="0"/>
+            </a:fillRef>
+            <a:effectRef idx="0">
+              <a:scrgbClr r="0" g="0" b="0"/>
+            </a:effectRef>
+            <a:fontRef idx="minor">
+              <a:schemeClr val="dk1">
+                <a:hueOff val="0"/>
+                <a:satOff val="0"/>
+                <a:lumOff val="0"/>
+                <a:alphaOff val="0"/>
+              </a:schemeClr>
+            </a:fontRef>
+          </p:style>
+          <p:txBody>
+            <a:bodyPr spcFirstLastPara="0" vert="horz" wrap="square" lIns="0" tIns="0" rIns="0" bIns="0" numCol="1" spcCol="1270" anchor="ctr" anchorCtr="0">
+              <a:noAutofit/>
+            </a:bodyPr>
+            <a:lstStyle/>
+            <a:p>
+              <a:pPr marL="0" lvl="0" indent="0" algn="ctr" defTabSz="755650" rtl="0">
+                <a:lnSpc>
+                  <a:spcPct val="90000"/>
+                </a:lnSpc>
+                <a:spcBef>
+                  <a:spcPct val="0"/>
+                </a:spcBef>
+                <a:spcAft>
+                  <a:spcPct val="35000"/>
+                </a:spcAft>
+                <a:buNone/>
+              </a:pPr>
+              <a:endParaRPr lang="en-US" sz="1400" kern="1200">
+                <a:latin typeface="Bodoni MT" panose="02070603080606020203" pitchFamily="18" charset="77"/>
+              </a:endParaRPr>
+            </a:p>
+          </p:txBody>
+        </p:sp>
+      </p:grpSp>
+      <p:sp>
+        <p:nvSpPr>
+          <p:cNvPr id="19" name="Rounded Rectangle 18">
+            <a:extLst>
+              <a:ext uri="{FF2B5EF4-FFF2-40B4-BE49-F238E27FC236}">
+                <a16:creationId xmlns:a16="http://schemas.microsoft.com/office/drawing/2014/main" id="{B245DE4D-610B-2916-DD68-43BBF6C1F6D3}"/>
+              </a:ext>
+            </a:extLst>
+          </p:cNvPr>
+          <p:cNvSpPr/>
+          <p:nvPr/>
+        </p:nvSpPr>
+        <p:spPr>
+          <a:xfrm>
+            <a:off x="4577944" y="761107"/>
+            <a:ext cx="6373833" cy="947003"/>
+          </a:xfrm>
+          <a:prstGeom prst="roundRect">
+            <a:avLst/>
+          </a:prstGeom>
+          <a:solidFill>
+            <a:srgbClr val="CCC6E2"/>
+          </a:solidFill>
+          <a:ln w="12700" cap="flat" cmpd="sng" algn="ctr">
+            <a:solidFill>
+              <a:prstClr val="black">
+                <a:shade val="80000"/>
+                <a:hueOff val="0"/>
+                <a:satOff val="0"/>
+                <a:lumOff val="0"/>
+                <a:alphaOff val="0"/>
+              </a:prstClr>
+            </a:solidFill>
+            <a:prstDash val="solid"/>
+            <a:miter lim="800000"/>
+          </a:ln>
+          <a:effectLst/>
+        </p:spPr>
+        <p:txBody>
+          <a:bodyPr spcFirstLastPara="0" vert="horz" wrap="square" lIns="38100" tIns="38100" rIns="38100" bIns="38100" numCol="1" spcCol="1270" anchor="ctr" anchorCtr="0">
+            <a:noAutofit/>
+          </a:bodyPr>
+          <a:lstStyle/>
+          <a:p>
+            <a:r>
+              <a:rPr lang="en-US" sz="1400" dirty="0">
+                <a:latin typeface="Bodoni MT" panose="02070603080606020203" pitchFamily="18" charset="77"/>
+              </a:rPr>
+              <a:t>Records removed before screening:</a:t>
+            </a:r>
+          </a:p>
+          <a:p>
+            <a:r>
+              <a:rPr lang="en-US" sz="1400" dirty="0">
+                <a:latin typeface="Bodoni MT" panose="02070603080606020203" pitchFamily="18" charset="77"/>
+              </a:rPr>
+              <a:t>Duplicate records removed (n=4)</a:t>
+            </a:r>
+          </a:p>
+          <a:p>
+            <a:pPr>
+              <a:lnSpc>
+                <a:spcPct val="90000"/>
+              </a:lnSpc>
+            </a:pPr>
+            <a:endParaRPr lang="en-DE" sz="1400" dirty="0">
+              <a:solidFill>
+                <a:schemeClr val="tx1"/>
+              </a:solidFill>
+              <a:latin typeface="Bodoni MT" panose="02070603080606020203" pitchFamily="18" charset="77"/>
+            </a:endParaRPr>
+          </a:p>
+        </p:txBody>
+      </p:sp>
+      <p:sp>
+        <p:nvSpPr>
+          <p:cNvPr id="20" name="Rounded Rectangle 19">
+            <a:extLst>
+              <a:ext uri="{FF2B5EF4-FFF2-40B4-BE49-F238E27FC236}">
+                <a16:creationId xmlns:a16="http://schemas.microsoft.com/office/drawing/2014/main" id="{28BB2FF4-C2DA-62F8-CA2B-F26E5821D7EC}"/>
+              </a:ext>
+            </a:extLst>
+          </p:cNvPr>
+          <p:cNvSpPr/>
+          <p:nvPr/>
+        </p:nvSpPr>
+        <p:spPr>
+          <a:xfrm>
+            <a:off x="4577945" y="2154619"/>
+            <a:ext cx="6373834" cy="882869"/>
+          </a:xfrm>
+          <a:prstGeom prst="roundRect">
+            <a:avLst/>
+          </a:prstGeom>
+          <a:solidFill>
+            <a:srgbClr val="CCC6E2"/>
+          </a:solidFill>
+          <a:ln w="12700" cap="flat" cmpd="sng" algn="ctr">
+            <a:solidFill>
+              <a:prstClr val="black">
+                <a:shade val="80000"/>
+                <a:hueOff val="0"/>
+                <a:satOff val="0"/>
+                <a:lumOff val="0"/>
+                <a:alphaOff val="0"/>
+              </a:prstClr>
+            </a:solidFill>
+            <a:prstDash val="solid"/>
+            <a:miter lim="800000"/>
+          </a:ln>
+          <a:effectLst/>
+        </p:spPr>
+        <p:txBody>
+          <a:bodyPr spcFirstLastPara="0" vert="horz" wrap="square" lIns="38100" tIns="38100" rIns="38100" bIns="38100" numCol="1" spcCol="1270" anchor="ctr" anchorCtr="0">
+            <a:noAutofit/>
+          </a:bodyPr>
+          <a:lstStyle/>
+          <a:p>
+            <a:pPr algn="thaiDist"/>
+            <a:r>
+              <a:rPr lang="en-US" sz="1400" dirty="0">
+                <a:latin typeface="Bodoni MT" panose="02070603080606020203" pitchFamily="18" charset="77"/>
+              </a:rPr>
+              <a:t>Records excluded (n=</a:t>
+            </a:r>
+            <a:r>
+              <a:rPr lang="en-US" sz="1400">
+                <a:latin typeface="Bodoni MT" panose="02070603080606020203" pitchFamily="18" charset="77"/>
+              </a:rPr>
+              <a:t>1954)</a:t>
+            </a:r>
+            <a:endParaRPr lang="en-US" sz="1400" dirty="0">
+              <a:latin typeface="Bodoni MT" panose="02070603080606020203" pitchFamily="18" charset="77"/>
+            </a:endParaRPr>
+          </a:p>
+        </p:txBody>
+      </p:sp>
+      <p:sp>
+        <p:nvSpPr>
+          <p:cNvPr id="21" name="Rounded Rectangle 20">
+            <a:extLst>
+              <a:ext uri="{FF2B5EF4-FFF2-40B4-BE49-F238E27FC236}">
+                <a16:creationId xmlns:a16="http://schemas.microsoft.com/office/drawing/2014/main" id="{A332B13B-A453-01B3-547C-431723966C62}"/>
+              </a:ext>
+            </a:extLst>
+          </p:cNvPr>
+          <p:cNvSpPr/>
+          <p:nvPr/>
+        </p:nvSpPr>
+        <p:spPr>
+          <a:xfrm>
+            <a:off x="4577945" y="3510455"/>
+            <a:ext cx="6373834" cy="1387366"/>
+          </a:xfrm>
+          <a:prstGeom prst="roundRect">
+            <a:avLst/>
+          </a:prstGeom>
+          <a:solidFill>
+            <a:srgbClr val="CCC6E2"/>
+          </a:solidFill>
+          <a:ln w="12700" cap="flat" cmpd="sng" algn="ctr">
+            <a:solidFill>
+              <a:prstClr val="black">
+                <a:shade val="80000"/>
+                <a:hueOff val="0"/>
+                <a:satOff val="0"/>
+                <a:lumOff val="0"/>
+                <a:alphaOff val="0"/>
+              </a:prstClr>
+            </a:solidFill>
+            <a:prstDash val="solid"/>
+            <a:miter lim="800000"/>
+          </a:ln>
+          <a:effectLst/>
+        </p:spPr>
+        <p:txBody>
+          <a:bodyPr spcFirstLastPara="0" vert="horz" wrap="square" lIns="38100" tIns="38100" rIns="38100" bIns="38100" numCol="1" spcCol="1270" anchor="t" anchorCtr="0">
+            <a:noAutofit/>
+          </a:bodyPr>
+          <a:lstStyle/>
+          <a:p>
+            <a:r>
+              <a:rPr lang="en-US" sz="1400" dirty="0">
+                <a:latin typeface="Bodoni MT" panose="02070603080606020203" pitchFamily="18" charset="77"/>
+              </a:rPr>
+              <a:t>Reports excluded:</a:t>
+            </a:r>
+          </a:p>
+          <a:p>
+            <a:pPr marL="285750" indent="-285750">
+              <a:buFont typeface="Arial" panose="020B0604020202020204" pitchFamily="34" charset="0"/>
+              <a:buChar char="•"/>
+            </a:pPr>
+            <a:r>
+              <a:rPr lang="en-US" sz="1400" dirty="0">
+                <a:latin typeface="Bodoni MT" panose="02070603080606020203" pitchFamily="18" charset="77"/>
+              </a:rPr>
+              <a:t>Reason 1: No concrete medical supervised ML use case (n= 87) </a:t>
+            </a:r>
+          </a:p>
+          <a:p>
+            <a:pPr marL="285750" indent="-285750">
+              <a:buFont typeface="Arial" panose="020B0604020202020204" pitchFamily="34" charset="0"/>
+              <a:buChar char="•"/>
+            </a:pPr>
+            <a:r>
+              <a:rPr lang="en-US" sz="1400" dirty="0">
+                <a:latin typeface="Bodoni MT" panose="02070603080606020203" pitchFamily="18" charset="77"/>
+              </a:rPr>
+              <a:t>Reason 2: No XAI method provided (n= 64)</a:t>
+            </a:r>
+          </a:p>
+          <a:p>
+            <a:pPr marL="285750" indent="-285750">
+              <a:buFont typeface="Arial" panose="020B0604020202020204" pitchFamily="34" charset="0"/>
+              <a:buChar char="•"/>
+            </a:pPr>
+            <a:r>
+              <a:rPr lang="en-US" sz="1400" dirty="0">
+                <a:latin typeface="Bodoni MT" panose="02070603080606020203" pitchFamily="18" charset="77"/>
+              </a:rPr>
+              <a:t>Reason 3: No tabular or image data as input (n= 13)</a:t>
+            </a:r>
+          </a:p>
+          <a:p>
+            <a:r>
+              <a:rPr lang="en-US" sz="1400" dirty="0">
+                <a:latin typeface="Bodoni MT" panose="02070603080606020203" pitchFamily="18" charset="77"/>
+              </a:rPr>
+              <a:t>Multiple reasons were possible.</a:t>
+            </a:r>
+          </a:p>
+        </p:txBody>
+      </p:sp>
+      <p:sp>
+        <p:nvSpPr>
+          <p:cNvPr id="24" name="Rounded Rectangle 23">
+            <a:extLst>
+              <a:ext uri="{FF2B5EF4-FFF2-40B4-BE49-F238E27FC236}">
+                <a16:creationId xmlns:a16="http://schemas.microsoft.com/office/drawing/2014/main" id="{0CDC65BD-FC66-D70A-0D0D-923B5718FA18}"/>
+              </a:ext>
+            </a:extLst>
+          </p:cNvPr>
+          <p:cNvSpPr/>
+          <p:nvPr/>
+        </p:nvSpPr>
+        <p:spPr>
+          <a:xfrm>
+            <a:off x="2260413" y="112166"/>
+            <a:ext cx="8691364" cy="476928"/>
+          </a:xfrm>
+          <a:prstGeom prst="roundRect">
+            <a:avLst/>
+          </a:prstGeom>
+          <a:solidFill>
+            <a:srgbClr val="6956A6"/>
+          </a:solidFill>
+          <a:ln w="12700" cap="flat" cmpd="sng" algn="ctr">
+            <a:solidFill>
+              <a:prstClr val="black">
+                <a:shade val="80000"/>
+                <a:hueOff val="0"/>
+                <a:satOff val="0"/>
+                <a:lumOff val="0"/>
+                <a:alphaOff val="0"/>
+              </a:prstClr>
+            </a:solidFill>
+            <a:prstDash val="solid"/>
+            <a:miter lim="800000"/>
+          </a:ln>
+          <a:effectLst/>
+        </p:spPr>
+        <p:txBody>
+          <a:bodyPr spcFirstLastPara="0" vert="horz" wrap="square" lIns="38100" tIns="38100" rIns="38100" bIns="38100" numCol="1" spcCol="1270" anchor="ctr" anchorCtr="0">
+            <a:noAutofit/>
+          </a:bodyPr>
+          <a:lstStyle/>
+          <a:p>
+            <a:pPr algn="ctr"/>
+            <a:r>
+              <a:rPr lang="en-US" sz="1400" dirty="0">
+                <a:solidFill>
+                  <a:schemeClr val="bg1"/>
+                </a:solidFill>
+                <a:latin typeface="Bodoni MT" panose="02070603080606020203" pitchFamily="18" charset="77"/>
+              </a:rPr>
+              <a:t>Identification of new studies via databases and registers</a:t>
+            </a:r>
+            <a:endParaRPr lang="en-DE" sz="1400" dirty="0">
+              <a:solidFill>
+                <a:schemeClr val="bg1"/>
+              </a:solidFill>
+              <a:latin typeface="Bodoni MT" panose="02070603080606020203" pitchFamily="18" charset="77"/>
+            </a:endParaRPr>
+          </a:p>
+        </p:txBody>
+      </p:sp>
     </p:spTree>
     <p:extLst>
       <p:ext uri="{BB962C8B-B14F-4D97-AF65-F5344CB8AC3E}">

</xml_diff>